<commit_message>
some reviewer 2 comments; some bibtex edits
</commit_message>
<xml_diff>
--- a/poster/Seed Zone Data Poster 01-10-2025.pptx
+++ b/poster/Seed Zone Data Poster 01-10-2025.pptx
@@ -43,7 +43,7 @@
         <p:txBody>
           <a:bodyPr/>
           <a:p>
-            <a:fld id="{47567D7B-A471-4867-9C24-F450C06403D3}" type="slidenum">
+            <a:fld id="{1082775F-21B5-42A4-981F-7051F5FAAE5C}" type="slidenum">
               <a:t>&lt;#&gt;</a:t>
             </a:fld>
           </a:p>
@@ -73,7 +73,7 @@
       </p:grpSpPr>
       <p:sp>
         <p:nvSpPr>
-          <p:cNvPr id="24" name="PlaceHolder 1"/>
+          <p:cNvPr id="22" name="PlaceHolder 1"/>
           <p:cNvSpPr>
             <a:spLocks noGrp="1"/>
           </p:cNvSpPr>
@@ -83,8 +83,8 @@
         </p:nvSpPr>
         <p:spPr>
           <a:xfrm>
-            <a:off x="311760" y="744480"/>
-            <a:ext cx="8519400" cy="2051640"/>
+            <a:off x="457200" y="205200"/>
+            <a:ext cx="8229240" cy="858600"/>
           </a:xfrm>
           <a:prstGeom prst="rect">
             <a:avLst/>
@@ -110,7 +110,7 @@
       </p:sp>
       <p:sp>
         <p:nvSpPr>
-          <p:cNvPr id="25" name="PlaceHolder 2"/>
+          <p:cNvPr id="23" name="PlaceHolder 2"/>
           <p:cNvSpPr>
             <a:spLocks noGrp="1"/>
           </p:cNvSpPr>
@@ -121,7 +121,7 @@
         <p:spPr>
           <a:xfrm>
             <a:off x="457200" y="1203480"/>
-            <a:ext cx="8228880" cy="1422360"/>
+            <a:ext cx="8229240" cy="1422720"/>
           </a:xfrm>
           <a:prstGeom prst="rect">
             <a:avLst/>
@@ -144,7 +144,7 @@
       </p:sp>
       <p:sp>
         <p:nvSpPr>
-          <p:cNvPr id="26" name="PlaceHolder 3"/>
+          <p:cNvPr id="24" name="PlaceHolder 3"/>
           <p:cNvSpPr>
             <a:spLocks noGrp="1"/>
           </p:cNvSpPr>
@@ -154,8 +154,8 @@
         </p:nvSpPr>
         <p:spPr>
           <a:xfrm>
-            <a:off x="457200" y="2761200"/>
-            <a:ext cx="8228880" cy="1422360"/>
+            <a:off x="457200" y="2761920"/>
+            <a:ext cx="8229240" cy="1422720"/>
           </a:xfrm>
           <a:prstGeom prst="rect">
             <a:avLst/>
@@ -190,7 +190,7 @@
         <p:txBody>
           <a:bodyPr/>
           <a:p>
-            <a:fld id="{C00FFA9A-0631-4B46-A0FF-254531FED526}" type="slidenum">
+            <a:fld id="{0E8CBC3D-4169-43DF-B300-C773128162FD}" type="slidenum">
               <a:t>&lt;#&gt;</a:t>
             </a:fld>
           </a:p>
@@ -220,7 +220,7 @@
       </p:grpSpPr>
       <p:sp>
         <p:nvSpPr>
-          <p:cNvPr id="27" name="PlaceHolder 1"/>
+          <p:cNvPr id="25" name="PlaceHolder 1"/>
           <p:cNvSpPr>
             <a:spLocks noGrp="1"/>
           </p:cNvSpPr>
@@ -230,8 +230,8 @@
         </p:nvSpPr>
         <p:spPr>
           <a:xfrm>
-            <a:off x="311760" y="744480"/>
-            <a:ext cx="8519400" cy="2051640"/>
+            <a:off x="457200" y="205200"/>
+            <a:ext cx="8229240" cy="858600"/>
           </a:xfrm>
           <a:prstGeom prst="rect">
             <a:avLst/>
@@ -257,7 +257,7 @@
       </p:sp>
       <p:sp>
         <p:nvSpPr>
-          <p:cNvPr id="28" name="PlaceHolder 2"/>
+          <p:cNvPr id="26" name="PlaceHolder 2"/>
           <p:cNvSpPr>
             <a:spLocks noGrp="1"/>
           </p:cNvSpPr>
@@ -268,7 +268,7 @@
         <p:spPr>
           <a:xfrm>
             <a:off x="457200" y="1203480"/>
-            <a:ext cx="4015440" cy="1422360"/>
+            <a:ext cx="4015800" cy="1422720"/>
           </a:xfrm>
           <a:prstGeom prst="rect">
             <a:avLst/>
@@ -291,7 +291,7 @@
       </p:sp>
       <p:sp>
         <p:nvSpPr>
-          <p:cNvPr id="29" name="PlaceHolder 3"/>
+          <p:cNvPr id="27" name="PlaceHolder 3"/>
           <p:cNvSpPr>
             <a:spLocks noGrp="1"/>
           </p:cNvSpPr>
@@ -301,8 +301,8 @@
         </p:nvSpPr>
         <p:spPr>
           <a:xfrm>
-            <a:off x="4673880" y="1203480"/>
-            <a:ext cx="4015440" cy="1422360"/>
+            <a:off x="4674240" y="1203480"/>
+            <a:ext cx="4015800" cy="1422720"/>
           </a:xfrm>
           <a:prstGeom prst="rect">
             <a:avLst/>
@@ -325,7 +325,7 @@
       </p:sp>
       <p:sp>
         <p:nvSpPr>
-          <p:cNvPr id="30" name="PlaceHolder 4"/>
+          <p:cNvPr id="28" name="PlaceHolder 4"/>
           <p:cNvSpPr>
             <a:spLocks noGrp="1"/>
           </p:cNvSpPr>
@@ -335,8 +335,8 @@
         </p:nvSpPr>
         <p:spPr>
           <a:xfrm>
-            <a:off x="457200" y="2761200"/>
-            <a:ext cx="4015440" cy="1422360"/>
+            <a:off x="457200" y="2761920"/>
+            <a:ext cx="4015800" cy="1422720"/>
           </a:xfrm>
           <a:prstGeom prst="rect">
             <a:avLst/>
@@ -359,7 +359,7 @@
       </p:sp>
       <p:sp>
         <p:nvSpPr>
-          <p:cNvPr id="31" name="PlaceHolder 5"/>
+          <p:cNvPr id="29" name="PlaceHolder 5"/>
           <p:cNvSpPr>
             <a:spLocks noGrp="1"/>
           </p:cNvSpPr>
@@ -369,8 +369,8 @@
         </p:nvSpPr>
         <p:spPr>
           <a:xfrm>
-            <a:off x="4673880" y="2761200"/>
-            <a:ext cx="4015440" cy="1422360"/>
+            <a:off x="4674240" y="2761920"/>
+            <a:ext cx="4015800" cy="1422720"/>
           </a:xfrm>
           <a:prstGeom prst="rect">
             <a:avLst/>
@@ -405,7 +405,7 @@
         <p:txBody>
           <a:bodyPr/>
           <a:p>
-            <a:fld id="{04D2E8B5-719C-4162-8BE2-818477BC3681}" type="slidenum">
+            <a:fld id="{E0EA3DB7-6236-4B5E-AEA4-587BFCF9E9B6}" type="slidenum">
               <a:t>&lt;#&gt;</a:t>
             </a:fld>
           </a:p>
@@ -435,7 +435,7 @@
       </p:grpSpPr>
       <p:sp>
         <p:nvSpPr>
-          <p:cNvPr id="32" name="PlaceHolder 1"/>
+          <p:cNvPr id="30" name="PlaceHolder 1"/>
           <p:cNvSpPr>
             <a:spLocks noGrp="1"/>
           </p:cNvSpPr>
@@ -445,8 +445,8 @@
         </p:nvSpPr>
         <p:spPr>
           <a:xfrm>
-            <a:off x="311760" y="744480"/>
-            <a:ext cx="8519400" cy="2051640"/>
+            <a:off x="457200" y="205200"/>
+            <a:ext cx="8229240" cy="858600"/>
           </a:xfrm>
           <a:prstGeom prst="rect">
             <a:avLst/>
@@ -472,7 +472,7 @@
       </p:sp>
       <p:sp>
         <p:nvSpPr>
-          <p:cNvPr id="33" name="PlaceHolder 2"/>
+          <p:cNvPr id="31" name="PlaceHolder 2"/>
           <p:cNvSpPr>
             <a:spLocks noGrp="1"/>
           </p:cNvSpPr>
@@ -483,7 +483,7 @@
         <p:spPr>
           <a:xfrm>
             <a:off x="457200" y="1203480"/>
-            <a:ext cx="2649600" cy="1422360"/>
+            <a:ext cx="2649600" cy="1422720"/>
           </a:xfrm>
           <a:prstGeom prst="rect">
             <a:avLst/>
@@ -506,7 +506,7 @@
       </p:sp>
       <p:sp>
         <p:nvSpPr>
-          <p:cNvPr id="34" name="PlaceHolder 3"/>
+          <p:cNvPr id="32" name="PlaceHolder 3"/>
           <p:cNvSpPr>
             <a:spLocks noGrp="1"/>
           </p:cNvSpPr>
@@ -517,7 +517,7 @@
         <p:spPr>
           <a:xfrm>
             <a:off x="3239640" y="1203480"/>
-            <a:ext cx="2649600" cy="1422360"/>
+            <a:ext cx="2649600" cy="1422720"/>
           </a:xfrm>
           <a:prstGeom prst="rect">
             <a:avLst/>
@@ -540,7 +540,7 @@
       </p:sp>
       <p:sp>
         <p:nvSpPr>
-          <p:cNvPr id="35" name="PlaceHolder 4"/>
+          <p:cNvPr id="33" name="PlaceHolder 4"/>
           <p:cNvSpPr>
             <a:spLocks noGrp="1"/>
           </p:cNvSpPr>
@@ -551,7 +551,7 @@
         <p:spPr>
           <a:xfrm>
             <a:off x="6022080" y="1203480"/>
-            <a:ext cx="2649600" cy="1422360"/>
+            <a:ext cx="2649600" cy="1422720"/>
           </a:xfrm>
           <a:prstGeom prst="rect">
             <a:avLst/>
@@ -574,7 +574,7 @@
       </p:sp>
       <p:sp>
         <p:nvSpPr>
-          <p:cNvPr id="36" name="PlaceHolder 5"/>
+          <p:cNvPr id="34" name="PlaceHolder 5"/>
           <p:cNvSpPr>
             <a:spLocks noGrp="1"/>
           </p:cNvSpPr>
@@ -584,8 +584,8 @@
         </p:nvSpPr>
         <p:spPr>
           <a:xfrm>
-            <a:off x="457200" y="2761200"/>
-            <a:ext cx="2649600" cy="1422360"/>
+            <a:off x="457200" y="2761920"/>
+            <a:ext cx="2649600" cy="1422720"/>
           </a:xfrm>
           <a:prstGeom prst="rect">
             <a:avLst/>
@@ -608,7 +608,7 @@
       </p:sp>
       <p:sp>
         <p:nvSpPr>
-          <p:cNvPr id="37" name="PlaceHolder 6"/>
+          <p:cNvPr id="35" name="PlaceHolder 6"/>
           <p:cNvSpPr>
             <a:spLocks noGrp="1"/>
           </p:cNvSpPr>
@@ -618,8 +618,8 @@
         </p:nvSpPr>
         <p:spPr>
           <a:xfrm>
-            <a:off x="3239640" y="2761200"/>
-            <a:ext cx="2649600" cy="1422360"/>
+            <a:off x="3239640" y="2761920"/>
+            <a:ext cx="2649600" cy="1422720"/>
           </a:xfrm>
           <a:prstGeom prst="rect">
             <a:avLst/>
@@ -642,7 +642,7 @@
       </p:sp>
       <p:sp>
         <p:nvSpPr>
-          <p:cNvPr id="38" name="PlaceHolder 7"/>
+          <p:cNvPr id="36" name="PlaceHolder 7"/>
           <p:cNvSpPr>
             <a:spLocks noGrp="1"/>
           </p:cNvSpPr>
@@ -652,8 +652,8 @@
         </p:nvSpPr>
         <p:spPr>
           <a:xfrm>
-            <a:off x="6022080" y="2761200"/>
-            <a:ext cx="2649600" cy="1422360"/>
+            <a:off x="6022080" y="2761920"/>
+            <a:ext cx="2649600" cy="1422720"/>
           </a:xfrm>
           <a:prstGeom prst="rect">
             <a:avLst/>
@@ -688,7 +688,7 @@
         <p:txBody>
           <a:bodyPr/>
           <a:p>
-            <a:fld id="{7857F8F5-2723-4621-9336-A03837922A0B}" type="slidenum">
+            <a:fld id="{5AC78082-0B85-40A5-9B1E-5F25B8F2DE31}" type="slidenum">
               <a:t>&lt;#&gt;</a:t>
             </a:fld>
           </a:p>
@@ -718,7 +718,7 @@
       </p:grpSpPr>
       <p:sp>
         <p:nvSpPr>
-          <p:cNvPr id="3" name="PlaceHolder 1"/>
+          <p:cNvPr id="1" name="PlaceHolder 1"/>
           <p:cNvSpPr>
             <a:spLocks noGrp="1"/>
           </p:cNvSpPr>
@@ -728,8 +728,8 @@
         </p:nvSpPr>
         <p:spPr>
           <a:xfrm>
-            <a:off x="311760" y="744480"/>
-            <a:ext cx="8519400" cy="2051640"/>
+            <a:off x="457200" y="205200"/>
+            <a:ext cx="8229240" cy="858600"/>
           </a:xfrm>
           <a:prstGeom prst="rect">
             <a:avLst/>
@@ -755,7 +755,7 @@
       </p:sp>
       <p:sp>
         <p:nvSpPr>
-          <p:cNvPr id="4" name="PlaceHolder 2"/>
+          <p:cNvPr id="2" name="PlaceHolder 2"/>
           <p:cNvSpPr>
             <a:spLocks noGrp="1"/>
           </p:cNvSpPr>
@@ -766,7 +766,7 @@
         <p:spPr>
           <a:xfrm>
             <a:off x="457200" y="1203480"/>
-            <a:ext cx="8228880" cy="2982600"/>
+            <a:ext cx="8229240" cy="2982960"/>
           </a:xfrm>
           <a:prstGeom prst="rect">
             <a:avLst/>
@@ -804,7 +804,7 @@
         <p:txBody>
           <a:bodyPr/>
           <a:p>
-            <a:fld id="{3F44AB59-22CB-4632-BEA1-0F461C84DBA4}" type="slidenum">
+            <a:fld id="{8A0A571E-DD76-4952-88CF-F203D0DCDE25}" type="slidenum">
               <a:t>&lt;#&gt;</a:t>
             </a:fld>
           </a:p>
@@ -834,7 +834,7 @@
       </p:grpSpPr>
       <p:sp>
         <p:nvSpPr>
-          <p:cNvPr id="5" name="PlaceHolder 1"/>
+          <p:cNvPr id="3" name="PlaceHolder 1"/>
           <p:cNvSpPr>
             <a:spLocks noGrp="1"/>
           </p:cNvSpPr>
@@ -844,8 +844,8 @@
         </p:nvSpPr>
         <p:spPr>
           <a:xfrm>
-            <a:off x="311760" y="744480"/>
-            <a:ext cx="8519400" cy="2051640"/>
+            <a:off x="457200" y="205200"/>
+            <a:ext cx="8229240" cy="858600"/>
           </a:xfrm>
           <a:prstGeom prst="rect">
             <a:avLst/>
@@ -871,7 +871,7 @@
       </p:sp>
       <p:sp>
         <p:nvSpPr>
-          <p:cNvPr id="6" name="PlaceHolder 2"/>
+          <p:cNvPr id="4" name="PlaceHolder 2"/>
           <p:cNvSpPr>
             <a:spLocks noGrp="1"/>
           </p:cNvSpPr>
@@ -882,7 +882,7 @@
         <p:spPr>
           <a:xfrm>
             <a:off x="457200" y="1203480"/>
-            <a:ext cx="8228880" cy="2982600"/>
+            <a:ext cx="8229240" cy="2982960"/>
           </a:xfrm>
           <a:prstGeom prst="rect">
             <a:avLst/>
@@ -917,7 +917,7 @@
         <p:txBody>
           <a:bodyPr/>
           <a:p>
-            <a:fld id="{84F006FC-5C99-45AA-AA35-80B5790D1CCE}" type="slidenum">
+            <a:fld id="{4B9D562C-D015-476A-A66B-A0A5BC5537B6}" type="slidenum">
               <a:t>&lt;#&gt;</a:t>
             </a:fld>
           </a:p>
@@ -947,7 +947,7 @@
       </p:grpSpPr>
       <p:sp>
         <p:nvSpPr>
-          <p:cNvPr id="7" name="PlaceHolder 1"/>
+          <p:cNvPr id="5" name="PlaceHolder 1"/>
           <p:cNvSpPr>
             <a:spLocks noGrp="1"/>
           </p:cNvSpPr>
@@ -957,8 +957,8 @@
         </p:nvSpPr>
         <p:spPr>
           <a:xfrm>
-            <a:off x="311760" y="744480"/>
-            <a:ext cx="8519400" cy="2051640"/>
+            <a:off x="457200" y="205200"/>
+            <a:ext cx="8229240" cy="858600"/>
           </a:xfrm>
           <a:prstGeom prst="rect">
             <a:avLst/>
@@ -984,7 +984,7 @@
       </p:sp>
       <p:sp>
         <p:nvSpPr>
-          <p:cNvPr id="8" name="PlaceHolder 2"/>
+          <p:cNvPr id="6" name="PlaceHolder 2"/>
           <p:cNvSpPr>
             <a:spLocks noGrp="1"/>
           </p:cNvSpPr>
@@ -995,7 +995,7 @@
         <p:spPr>
           <a:xfrm>
             <a:off x="457200" y="1203480"/>
-            <a:ext cx="4015440" cy="2982600"/>
+            <a:ext cx="4015800" cy="2982960"/>
           </a:xfrm>
           <a:prstGeom prst="rect">
             <a:avLst/>
@@ -1018,7 +1018,7 @@
       </p:sp>
       <p:sp>
         <p:nvSpPr>
-          <p:cNvPr id="9" name="PlaceHolder 3"/>
+          <p:cNvPr id="7" name="PlaceHolder 3"/>
           <p:cNvSpPr>
             <a:spLocks noGrp="1"/>
           </p:cNvSpPr>
@@ -1028,8 +1028,8 @@
         </p:nvSpPr>
         <p:spPr>
           <a:xfrm>
-            <a:off x="4673880" y="1203480"/>
-            <a:ext cx="4015440" cy="2982600"/>
+            <a:off x="4674240" y="1203480"/>
+            <a:ext cx="4015800" cy="2982960"/>
           </a:xfrm>
           <a:prstGeom prst="rect">
             <a:avLst/>
@@ -1064,7 +1064,7 @@
         <p:txBody>
           <a:bodyPr/>
           <a:p>
-            <a:fld id="{57AC37B9-BA12-40C8-84D5-A9B966AA3DC6}" type="slidenum">
+            <a:fld id="{88A94A45-AEAA-4292-9D5F-1EF7F780217C}" type="slidenum">
               <a:t>&lt;#&gt;</a:t>
             </a:fld>
           </a:p>
@@ -1094,7 +1094,7 @@
       </p:grpSpPr>
       <p:sp>
         <p:nvSpPr>
-          <p:cNvPr id="10" name="PlaceHolder 1"/>
+          <p:cNvPr id="8" name="PlaceHolder 1"/>
           <p:cNvSpPr>
             <a:spLocks noGrp="1"/>
           </p:cNvSpPr>
@@ -1104,8 +1104,8 @@
         </p:nvSpPr>
         <p:spPr>
           <a:xfrm>
-            <a:off x="311760" y="744480"/>
-            <a:ext cx="8519400" cy="2051640"/>
+            <a:off x="457200" y="205200"/>
+            <a:ext cx="8229240" cy="858600"/>
           </a:xfrm>
           <a:prstGeom prst="rect">
             <a:avLst/>
@@ -1143,7 +1143,7 @@
         <p:txBody>
           <a:bodyPr/>
           <a:p>
-            <a:fld id="{F112E776-0FD6-4908-9489-2358B1AEEC2E}" type="slidenum">
+            <a:fld id="{810441D5-D5BA-495E-9235-A22183561700}" type="slidenum">
               <a:t>&lt;#&gt;</a:t>
             </a:fld>
           </a:p>
@@ -1173,7 +1173,7 @@
       </p:grpSpPr>
       <p:sp>
         <p:nvSpPr>
-          <p:cNvPr id="11" name="PlaceHolder 1"/>
+          <p:cNvPr id="9" name="PlaceHolder 1"/>
           <p:cNvSpPr>
             <a:spLocks noGrp="1"/>
           </p:cNvSpPr>
@@ -1183,8 +1183,8 @@
         </p:nvSpPr>
         <p:spPr>
           <a:xfrm>
-            <a:off x="311760" y="744480"/>
-            <a:ext cx="8519400" cy="9511560"/>
+            <a:off x="457200" y="205200"/>
+            <a:ext cx="8229240" cy="3981240"/>
           </a:xfrm>
           <a:prstGeom prst="rect">
             <a:avLst/>
@@ -1222,7 +1222,7 @@
         <p:txBody>
           <a:bodyPr/>
           <a:p>
-            <a:fld id="{1F9C839E-BB0E-4B16-AE46-630232DB76A3}" type="slidenum">
+            <a:fld id="{12590B69-4C6C-44F6-804D-94D1919E45AF}" type="slidenum">
               <a:t>&lt;#&gt;</a:t>
             </a:fld>
           </a:p>
@@ -1252,7 +1252,7 @@
       </p:grpSpPr>
       <p:sp>
         <p:nvSpPr>
-          <p:cNvPr id="12" name="PlaceHolder 1"/>
+          <p:cNvPr id="10" name="PlaceHolder 1"/>
           <p:cNvSpPr>
             <a:spLocks noGrp="1"/>
           </p:cNvSpPr>
@@ -1262,8 +1262,8 @@
         </p:nvSpPr>
         <p:spPr>
           <a:xfrm>
-            <a:off x="311760" y="744480"/>
-            <a:ext cx="8519400" cy="2051640"/>
+            <a:off x="457200" y="205200"/>
+            <a:ext cx="8229240" cy="858600"/>
           </a:xfrm>
           <a:prstGeom prst="rect">
             <a:avLst/>
@@ -1289,7 +1289,7 @@
       </p:sp>
       <p:sp>
         <p:nvSpPr>
-          <p:cNvPr id="13" name="PlaceHolder 2"/>
+          <p:cNvPr id="11" name="PlaceHolder 2"/>
           <p:cNvSpPr>
             <a:spLocks noGrp="1"/>
           </p:cNvSpPr>
@@ -1300,7 +1300,7 @@
         <p:spPr>
           <a:xfrm>
             <a:off x="457200" y="1203480"/>
-            <a:ext cx="4015440" cy="1422360"/>
+            <a:ext cx="4015800" cy="1422720"/>
           </a:xfrm>
           <a:prstGeom prst="rect">
             <a:avLst/>
@@ -1323,7 +1323,7 @@
       </p:sp>
       <p:sp>
         <p:nvSpPr>
-          <p:cNvPr id="14" name="PlaceHolder 3"/>
+          <p:cNvPr id="12" name="PlaceHolder 3"/>
           <p:cNvSpPr>
             <a:spLocks noGrp="1"/>
           </p:cNvSpPr>
@@ -1333,8 +1333,8 @@
         </p:nvSpPr>
         <p:spPr>
           <a:xfrm>
-            <a:off x="4673880" y="1203480"/>
-            <a:ext cx="4015440" cy="2982600"/>
+            <a:off x="4674240" y="1203480"/>
+            <a:ext cx="4015800" cy="2982960"/>
           </a:xfrm>
           <a:prstGeom prst="rect">
             <a:avLst/>
@@ -1357,7 +1357,7 @@
       </p:sp>
       <p:sp>
         <p:nvSpPr>
-          <p:cNvPr id="15" name="PlaceHolder 4"/>
+          <p:cNvPr id="13" name="PlaceHolder 4"/>
           <p:cNvSpPr>
             <a:spLocks noGrp="1"/>
           </p:cNvSpPr>
@@ -1367,8 +1367,8 @@
         </p:nvSpPr>
         <p:spPr>
           <a:xfrm>
-            <a:off x="457200" y="2761200"/>
-            <a:ext cx="4015440" cy="1422360"/>
+            <a:off x="457200" y="2761920"/>
+            <a:ext cx="4015800" cy="1422720"/>
           </a:xfrm>
           <a:prstGeom prst="rect">
             <a:avLst/>
@@ -1403,7 +1403,7 @@
         <p:txBody>
           <a:bodyPr/>
           <a:p>
-            <a:fld id="{C0ECFF30-608B-481E-B88F-82462C4649A8}" type="slidenum">
+            <a:fld id="{FB63F1CC-EC1D-4398-A491-BD0C290B3CFF}" type="slidenum">
               <a:t>&lt;#&gt;</a:t>
             </a:fld>
           </a:p>
@@ -1433,7 +1433,7 @@
       </p:grpSpPr>
       <p:sp>
         <p:nvSpPr>
-          <p:cNvPr id="16" name="PlaceHolder 1"/>
+          <p:cNvPr id="14" name="PlaceHolder 1"/>
           <p:cNvSpPr>
             <a:spLocks noGrp="1"/>
           </p:cNvSpPr>
@@ -1443,8 +1443,8 @@
         </p:nvSpPr>
         <p:spPr>
           <a:xfrm>
-            <a:off x="311760" y="744480"/>
-            <a:ext cx="8519400" cy="2051640"/>
+            <a:off x="457200" y="205200"/>
+            <a:ext cx="8229240" cy="858600"/>
           </a:xfrm>
           <a:prstGeom prst="rect">
             <a:avLst/>
@@ -1470,7 +1470,7 @@
       </p:sp>
       <p:sp>
         <p:nvSpPr>
-          <p:cNvPr id="17" name="PlaceHolder 2"/>
+          <p:cNvPr id="15" name="PlaceHolder 2"/>
           <p:cNvSpPr>
             <a:spLocks noGrp="1"/>
           </p:cNvSpPr>
@@ -1481,7 +1481,7 @@
         <p:spPr>
           <a:xfrm>
             <a:off x="457200" y="1203480"/>
-            <a:ext cx="4015440" cy="2982600"/>
+            <a:ext cx="4015800" cy="2982960"/>
           </a:xfrm>
           <a:prstGeom prst="rect">
             <a:avLst/>
@@ -1504,7 +1504,7 @@
       </p:sp>
       <p:sp>
         <p:nvSpPr>
-          <p:cNvPr id="18" name="PlaceHolder 3"/>
+          <p:cNvPr id="16" name="PlaceHolder 3"/>
           <p:cNvSpPr>
             <a:spLocks noGrp="1"/>
           </p:cNvSpPr>
@@ -1514,8 +1514,8 @@
         </p:nvSpPr>
         <p:spPr>
           <a:xfrm>
-            <a:off x="4673880" y="1203480"/>
-            <a:ext cx="4015440" cy="1422360"/>
+            <a:off x="4674240" y="1203480"/>
+            <a:ext cx="4015800" cy="1422720"/>
           </a:xfrm>
           <a:prstGeom prst="rect">
             <a:avLst/>
@@ -1538,7 +1538,7 @@
       </p:sp>
       <p:sp>
         <p:nvSpPr>
-          <p:cNvPr id="19" name="PlaceHolder 4"/>
+          <p:cNvPr id="17" name="PlaceHolder 4"/>
           <p:cNvSpPr>
             <a:spLocks noGrp="1"/>
           </p:cNvSpPr>
@@ -1548,8 +1548,8 @@
         </p:nvSpPr>
         <p:spPr>
           <a:xfrm>
-            <a:off x="4673880" y="2761200"/>
-            <a:ext cx="4015440" cy="1422360"/>
+            <a:off x="4674240" y="2761920"/>
+            <a:ext cx="4015800" cy="1422720"/>
           </a:xfrm>
           <a:prstGeom prst="rect">
             <a:avLst/>
@@ -1584,7 +1584,7 @@
         <p:txBody>
           <a:bodyPr/>
           <a:p>
-            <a:fld id="{8163A062-5D6E-4415-87B3-DEDB5854910B}" type="slidenum">
+            <a:fld id="{8FF2E93D-98D8-4BF8-90F2-7A493CDA1DDC}" type="slidenum">
               <a:t>&lt;#&gt;</a:t>
             </a:fld>
           </a:p>
@@ -1614,7 +1614,7 @@
       </p:grpSpPr>
       <p:sp>
         <p:nvSpPr>
-          <p:cNvPr id="20" name="PlaceHolder 1"/>
+          <p:cNvPr id="18" name="PlaceHolder 1"/>
           <p:cNvSpPr>
             <a:spLocks noGrp="1"/>
           </p:cNvSpPr>
@@ -1624,8 +1624,8 @@
         </p:nvSpPr>
         <p:spPr>
           <a:xfrm>
-            <a:off x="311760" y="744480"/>
-            <a:ext cx="8519400" cy="2051640"/>
+            <a:off x="457200" y="205200"/>
+            <a:ext cx="8229240" cy="858600"/>
           </a:xfrm>
           <a:prstGeom prst="rect">
             <a:avLst/>
@@ -1651,7 +1651,7 @@
       </p:sp>
       <p:sp>
         <p:nvSpPr>
-          <p:cNvPr id="21" name="PlaceHolder 2"/>
+          <p:cNvPr id="19" name="PlaceHolder 2"/>
           <p:cNvSpPr>
             <a:spLocks noGrp="1"/>
           </p:cNvSpPr>
@@ -1662,7 +1662,7 @@
         <p:spPr>
           <a:xfrm>
             <a:off x="457200" y="1203480"/>
-            <a:ext cx="4015440" cy="1422360"/>
+            <a:ext cx="4015800" cy="1422720"/>
           </a:xfrm>
           <a:prstGeom prst="rect">
             <a:avLst/>
@@ -1685,7 +1685,7 @@
       </p:sp>
       <p:sp>
         <p:nvSpPr>
-          <p:cNvPr id="22" name="PlaceHolder 3"/>
+          <p:cNvPr id="20" name="PlaceHolder 3"/>
           <p:cNvSpPr>
             <a:spLocks noGrp="1"/>
           </p:cNvSpPr>
@@ -1695,8 +1695,8 @@
         </p:nvSpPr>
         <p:spPr>
           <a:xfrm>
-            <a:off x="4673880" y="1203480"/>
-            <a:ext cx="4015440" cy="1422360"/>
+            <a:off x="4674240" y="1203480"/>
+            <a:ext cx="4015800" cy="1422720"/>
           </a:xfrm>
           <a:prstGeom prst="rect">
             <a:avLst/>
@@ -1719,7 +1719,7 @@
       </p:sp>
       <p:sp>
         <p:nvSpPr>
-          <p:cNvPr id="23" name="PlaceHolder 4"/>
+          <p:cNvPr id="21" name="PlaceHolder 4"/>
           <p:cNvSpPr>
             <a:spLocks noGrp="1"/>
           </p:cNvSpPr>
@@ -1729,8 +1729,8 @@
         </p:nvSpPr>
         <p:spPr>
           <a:xfrm>
-            <a:off x="457200" y="2761200"/>
-            <a:ext cx="8228880" cy="1422360"/>
+            <a:off x="457200" y="2761920"/>
+            <a:ext cx="8229240" cy="1422720"/>
           </a:xfrm>
           <a:prstGeom prst="rect">
             <a:avLst/>
@@ -1765,7 +1765,7 @@
         <p:txBody>
           <a:bodyPr/>
           <a:p>
-            <a:fld id="{F3E26C6D-7EA0-4961-9A03-11E6AF17086A}" type="slidenum">
+            <a:fld id="{0D303699-8E6D-4894-8F9A-7B0430159AE5}" type="slidenum">
               <a:t>&lt;#&gt;</a:t>
             </a:fld>
           </a:p>
@@ -1807,236 +1807,13 @@
             <a:spLocks noGrp="1"/>
           </p:cNvSpPr>
           <p:nvPr>
-            <p:ph type="title"/>
-          </p:nvPr>
-        </p:nvSpPr>
-        <p:spPr>
-          <a:xfrm>
-            <a:off x="311760" y="744480"/>
-            <a:ext cx="8519400" cy="2051640"/>
-          </a:xfrm>
-          <a:prstGeom prst="rect">
-            <a:avLst/>
-          </a:prstGeom>
-          <a:noFill/>
-          <a:ln w="0">
-            <a:noFill/>
-          </a:ln>
-        </p:spPr>
-        <p:txBody>
-          <a:bodyPr lIns="0" rIns="0" tIns="0" bIns="0" anchor="ctr">
-            <a:noAutofit/>
-          </a:bodyPr>
-          <a:p>
-            <a:r>
-              <a:rPr b="0" lang="en-US" sz="1800" spc="-1" strike="noStrike">
-                <a:latin typeface="Arial"/>
-              </a:rPr>
-              <a:t>Click to edit the title text format</a:t>
-            </a:r>
-            <a:endParaRPr b="0" lang="en-US" sz="1800" spc="-1" strike="noStrike">
-              <a:latin typeface="Arial"/>
-            </a:endParaRPr>
-          </a:p>
-        </p:txBody>
-      </p:sp>
-      <p:sp>
-        <p:nvSpPr>
-          <p:cNvPr id="1" name="PlaceHolder 2"/>
-          <p:cNvSpPr>
-            <a:spLocks noGrp="1"/>
-          </p:cNvSpPr>
-          <p:nvPr>
-            <p:ph type="body"/>
-          </p:nvPr>
-        </p:nvSpPr>
-        <p:spPr>
-          <a:xfrm>
-            <a:off x="457200" y="1203480"/>
-            <a:ext cx="8228880" cy="2982600"/>
-          </a:xfrm>
-          <a:prstGeom prst="rect">
-            <a:avLst/>
-          </a:prstGeom>
-          <a:noFill/>
-          <a:ln w="0">
-            <a:noFill/>
-          </a:ln>
-        </p:spPr>
-        <p:txBody>
-          <a:bodyPr lIns="0" rIns="0" tIns="0" bIns="0" anchor="t">
-            <a:normAutofit/>
-          </a:bodyPr>
-          <a:p>
-            <a:pPr marL="432000" indent="-324000">
-              <a:spcBef>
-                <a:spcPts val="1417"/>
-              </a:spcBef>
-              <a:buClr>
-                <a:srgbClr val="000000"/>
-              </a:buClr>
-              <a:buSzPct val="45000"/>
-              <a:buFont typeface="Wingdings" charset="2"/>
-              <a:buChar char=""/>
-            </a:pPr>
-            <a:r>
-              <a:rPr b="0" lang="en-US" sz="1800" spc="-1" strike="noStrike">
-                <a:latin typeface="Arial"/>
-              </a:rPr>
-              <a:t>Click to edit the outline text format</a:t>
-            </a:r>
-            <a:endParaRPr b="0" lang="en-US" sz="1800" spc="-1" strike="noStrike">
-              <a:latin typeface="Arial"/>
-            </a:endParaRPr>
-          </a:p>
-          <a:p>
-            <a:pPr lvl="1" marL="864000" indent="-324000">
-              <a:spcBef>
-                <a:spcPts val="1134"/>
-              </a:spcBef>
-              <a:buClr>
-                <a:srgbClr val="000000"/>
-              </a:buClr>
-              <a:buSzPct val="75000"/>
-              <a:buFont typeface="Symbol" charset="2"/>
-              <a:buChar char=""/>
-            </a:pPr>
-            <a:r>
-              <a:rPr b="0" lang="en-US" sz="1800" spc="-1" strike="noStrike">
-                <a:latin typeface="Arial"/>
-              </a:rPr>
-              <a:t>Second Outline Level</a:t>
-            </a:r>
-            <a:endParaRPr b="0" lang="en-US" sz="1800" spc="-1" strike="noStrike">
-              <a:latin typeface="Arial"/>
-            </a:endParaRPr>
-          </a:p>
-          <a:p>
-            <a:pPr lvl="2" marL="1296000" indent="-288000">
-              <a:spcBef>
-                <a:spcPts val="850"/>
-              </a:spcBef>
-              <a:buClr>
-                <a:srgbClr val="000000"/>
-              </a:buClr>
-              <a:buSzPct val="45000"/>
-              <a:buFont typeface="Wingdings" charset="2"/>
-              <a:buChar char=""/>
-            </a:pPr>
-            <a:r>
-              <a:rPr b="0" lang="en-US" sz="1800" spc="-1" strike="noStrike">
-                <a:latin typeface="Arial"/>
-              </a:rPr>
-              <a:t>Third Outline Level</a:t>
-            </a:r>
-            <a:endParaRPr b="0" lang="en-US" sz="1800" spc="-1" strike="noStrike">
-              <a:latin typeface="Arial"/>
-            </a:endParaRPr>
-          </a:p>
-          <a:p>
-            <a:pPr lvl="3" marL="1728000" indent="-216000">
-              <a:spcBef>
-                <a:spcPts val="567"/>
-              </a:spcBef>
-              <a:buClr>
-                <a:srgbClr val="000000"/>
-              </a:buClr>
-              <a:buSzPct val="75000"/>
-              <a:buFont typeface="Symbol" charset="2"/>
-              <a:buChar char=""/>
-            </a:pPr>
-            <a:r>
-              <a:rPr b="0" lang="en-US" sz="1800" spc="-1" strike="noStrike">
-                <a:latin typeface="Arial"/>
-              </a:rPr>
-              <a:t>Fourth Outline Level</a:t>
-            </a:r>
-            <a:endParaRPr b="0" lang="en-US" sz="1800" spc="-1" strike="noStrike">
-              <a:latin typeface="Arial"/>
-            </a:endParaRPr>
-          </a:p>
-          <a:p>
-            <a:pPr lvl="4" marL="2160000" indent="-216000">
-              <a:spcBef>
-                <a:spcPts val="283"/>
-              </a:spcBef>
-              <a:buClr>
-                <a:srgbClr val="000000"/>
-              </a:buClr>
-              <a:buSzPct val="45000"/>
-              <a:buFont typeface="Wingdings" charset="2"/>
-              <a:buChar char=""/>
-            </a:pPr>
-            <a:r>
-              <a:rPr b="0" lang="en-US" sz="1800" spc="-1" strike="noStrike">
-                <a:latin typeface="Arial"/>
-              </a:rPr>
-              <a:t>Fifth Outline Level</a:t>
-            </a:r>
-            <a:endParaRPr b="0" lang="en-US" sz="1800" spc="-1" strike="noStrike">
-              <a:latin typeface="Arial"/>
-            </a:endParaRPr>
-          </a:p>
-          <a:p>
-            <a:pPr lvl="5" marL="2592000" indent="-216000">
-              <a:spcBef>
-                <a:spcPts val="283"/>
-              </a:spcBef>
-              <a:buClr>
-                <a:srgbClr val="000000"/>
-              </a:buClr>
-              <a:buSzPct val="45000"/>
-              <a:buFont typeface="Wingdings" charset="2"/>
-              <a:buChar char=""/>
-            </a:pPr>
-            <a:r>
-              <a:rPr b="0" lang="en-US" sz="1800" spc="-1" strike="noStrike">
-                <a:latin typeface="Arial"/>
-              </a:rPr>
-              <a:t>Sixth Outline Level</a:t>
-            </a:r>
-            <a:endParaRPr b="0" lang="en-US" sz="1800" spc="-1" strike="noStrike">
-              <a:latin typeface="Arial"/>
-            </a:endParaRPr>
-          </a:p>
-          <a:p>
-            <a:pPr lvl="6" marL="3024000" indent="-216000">
-              <a:spcBef>
-                <a:spcPts val="283"/>
-              </a:spcBef>
-              <a:buClr>
-                <a:srgbClr val="000000"/>
-              </a:buClr>
-              <a:buSzPct val="45000"/>
-              <a:buFont typeface="Wingdings" charset="2"/>
-              <a:buChar char=""/>
-            </a:pPr>
-            <a:r>
-              <a:rPr b="0" lang="en-US" sz="1800" spc="-1" strike="noStrike">
-                <a:latin typeface="Arial"/>
-              </a:rPr>
-              <a:t>Seventh Outline Level</a:t>
-            </a:r>
-            <a:endParaRPr b="0" lang="en-US" sz="1800" spc="-1" strike="noStrike">
-              <a:latin typeface="Arial"/>
-            </a:endParaRPr>
-          </a:p>
-        </p:txBody>
-      </p:sp>
-      <p:sp>
-        <p:nvSpPr>
-          <p:cNvPr id="2" name="PlaceHolder 3"/>
-          <p:cNvSpPr>
-            <a:spLocks noGrp="1"/>
-          </p:cNvSpPr>
-          <p:nvPr>
             <p:ph type="sldNum" idx="1"/>
           </p:nvPr>
         </p:nvSpPr>
         <p:spPr>
           <a:xfrm>
             <a:off x="8472600" y="4663080"/>
-            <a:ext cx="547560" cy="392400"/>
+            <a:ext cx="546120" cy="390960"/>
           </a:xfrm>
           <a:prstGeom prst="rect">
             <a:avLst/>
@@ -2078,7 +1855,7 @@
                 <a:tab algn="l" pos="0"/>
               </a:tabLst>
             </a:pPr>
-            <a:fld id="{824587F6-9F34-482A-B8F9-05B3F7C8F74E}" type="slidenum">
+            <a:fld id="{BDAE1283-C9CB-48AC-B419-4870AA38250E}" type="slidenum">
               <a:rPr b="0" lang="en" sz="1000" spc="-1" strike="noStrike">
                 <a:solidFill>
                   <a:srgbClr val="595959"/>
@@ -2140,63 +1917,14 @@
       </p:grpSpPr>
       <p:sp>
         <p:nvSpPr>
-          <p:cNvPr id="39" name="Rounded Rectangle 2"/>
+          <p:cNvPr id="37" name=""/>
           <p:cNvSpPr/>
           <p:nvPr/>
         </p:nvSpPr>
         <p:spPr>
           <a:xfrm>
-            <a:off x="8282160" y="73440"/>
-            <a:ext cx="801720" cy="364680"/>
-          </a:xfrm>
-          <a:prstGeom prst="roundRect">
-            <a:avLst>
-              <a:gd name="adj" fmla="val 16667"/>
-            </a:avLst>
-          </a:prstGeom>
-          <a:gradFill rotWithShape="0">
-            <a:gsLst>
-              <a:gs pos="0">
-                <a:srgbClr val="ef476f"/>
-              </a:gs>
-              <a:gs pos="100000">
-                <a:srgbClr val="ffffff"/>
-              </a:gs>
-            </a:gsLst>
-            <a:lin ang="3600000"/>
-          </a:gradFill>
-          <a:ln w="9525">
-            <a:solidFill>
-              <a:srgbClr val="000000"/>
-            </a:solidFill>
-            <a:round/>
-          </a:ln>
-        </p:spPr>
-        <p:style>
-          <a:lnRef idx="2">
-            <a:schemeClr val="accent1">
-              <a:shade val="50000"/>
-            </a:schemeClr>
-          </a:lnRef>
-          <a:fillRef idx="1">
-            <a:schemeClr val="accent1"/>
-          </a:fillRef>
-          <a:effectRef idx="0">
-            <a:schemeClr val="accent1"/>
-          </a:effectRef>
-          <a:fontRef idx="minor"/>
-        </p:style>
-      </p:sp>
-      <p:sp>
-        <p:nvSpPr>
-          <p:cNvPr id="40" name=""/>
-          <p:cNvSpPr/>
-          <p:nvPr/>
-        </p:nvSpPr>
-        <p:spPr>
-          <a:xfrm>
-            <a:off x="5652000" y="1257480"/>
-            <a:ext cx="3428280" cy="3999960"/>
+            <a:off x="5645880" y="1371600"/>
+            <a:ext cx="3427920" cy="3885480"/>
           </a:xfrm>
           <a:custGeom>
             <a:avLst/>
@@ -2204,19 +1932,19 @@
             <a:ahLst/>
             <a:rect l="l" t="t" r="r" b="b"/>
             <a:pathLst>
-              <a:path w="21600" h="24360">
+              <a:path w="21600" h="23040">
                 <a:moveTo>
                   <a:pt x="3600" y="0"/>
                 </a:moveTo>
                 <a:arcTo wR="3600" hR="3600" stAng="16200000" swAng="-5400000"/>
                 <a:lnTo>
-                  <a:pt x="0" y="20760"/>
+                  <a:pt x="0" y="19440"/>
                 </a:lnTo>
-                <a:arcTo wR="3600" hR="840" stAng="10800000" swAng="-5400000"/>
+                <a:arcTo wR="3600" hR="2160" stAng="10800000" swAng="-5400000"/>
                 <a:lnTo>
                   <a:pt x="18000" y="21600"/>
                 </a:lnTo>
-                <a:arcTo wR="3600" hR="840" stAng="5400000" swAng="-5400000"/>
+                <a:arcTo wR="3600" hR="2160" stAng="5400000" swAng="-5400000"/>
                 <a:lnTo>
                   <a:pt x="21600" y="3600"/>
                 </a:lnTo>
@@ -2234,11 +1962,11 @@
                 <a:srgbClr val="bcd8c1"/>
               </a:gs>
             </a:gsLst>
-            <a:lin ang="5400000"/>
+            <a:lin ang="3600000"/>
           </a:gradFill>
           <a:ln w="0">
             <a:solidFill>
-              <a:srgbClr val="000000"/>
+              <a:srgbClr val="3465a4"/>
             </a:solidFill>
           </a:ln>
         </p:spPr>
@@ -2251,14 +1979,63 @@
       </p:sp>
       <p:sp>
         <p:nvSpPr>
-          <p:cNvPr id="41" name=""/>
+          <p:cNvPr id="38" name="Rounded Rectangle 2"/>
           <p:cNvSpPr/>
           <p:nvPr/>
         </p:nvSpPr>
         <p:spPr>
           <a:xfrm>
+            <a:off x="8282160" y="73440"/>
+            <a:ext cx="800280" cy="363240"/>
+          </a:xfrm>
+          <a:prstGeom prst="roundRect">
+            <a:avLst>
+              <a:gd name="adj" fmla="val 16667"/>
+            </a:avLst>
+          </a:prstGeom>
+          <a:gradFill rotWithShape="0">
+            <a:gsLst>
+              <a:gs pos="0">
+                <a:srgbClr val="ef476f"/>
+              </a:gs>
+              <a:gs pos="100000">
+                <a:srgbClr val="ffffff"/>
+              </a:gs>
+            </a:gsLst>
+            <a:lin ang="3600000"/>
+          </a:gradFill>
+          <a:ln w="9525">
+            <a:solidFill>
+              <a:srgbClr val="000000"/>
+            </a:solidFill>
+            <a:round/>
+          </a:ln>
+        </p:spPr>
+        <p:style>
+          <a:lnRef idx="2">
+            <a:schemeClr val="accent1">
+              <a:shade val="50000"/>
+            </a:schemeClr>
+          </a:lnRef>
+          <a:fillRef idx="1">
+            <a:schemeClr val="accent1"/>
+          </a:fillRef>
+          <a:effectRef idx="0">
+            <a:schemeClr val="accent1"/>
+          </a:effectRef>
+          <a:fontRef idx="minor"/>
+        </p:style>
+      </p:sp>
+      <p:sp>
+        <p:nvSpPr>
+          <p:cNvPr id="39" name=""/>
+          <p:cNvSpPr/>
+          <p:nvPr/>
+        </p:nvSpPr>
+        <p:spPr>
+          <a:xfrm>
             <a:off x="109440" y="1600200"/>
-            <a:ext cx="3318840" cy="3428280"/>
+            <a:ext cx="3317400" cy="3426840"/>
           </a:xfrm>
           <a:custGeom>
             <a:avLst/>
@@ -2313,14 +2090,14 @@
       </p:sp>
       <p:sp>
         <p:nvSpPr>
-          <p:cNvPr id="42" name="Google Shape;54;p13"/>
+          <p:cNvPr id="40" name="Google Shape;54;p13"/>
           <p:cNvSpPr/>
           <p:nvPr/>
         </p:nvSpPr>
         <p:spPr>
           <a:xfrm>
             <a:off x="51120" y="64080"/>
-            <a:ext cx="6239160" cy="364680"/>
+            <a:ext cx="6237720" cy="363240"/>
           </a:xfrm>
           <a:prstGeom prst="roundRect">
             <a:avLst>
@@ -2351,7 +2128,7 @@
           <a:fontRef idx="minor"/>
         </p:style>
         <p:txBody>
-          <a:bodyPr lIns="90000" rIns="90000" tIns="329400" bIns="283680" anchor="ctr">
+          <a:bodyPr lIns="90000" rIns="90000" tIns="327960" bIns="282240" anchor="ctr">
             <a:noAutofit/>
           </a:bodyPr>
           <a:p>
@@ -2382,14 +2159,14 @@
       </p:sp>
       <p:sp>
         <p:nvSpPr>
-          <p:cNvPr id="43" name="Google Shape;55;p13"/>
+          <p:cNvPr id="41" name="Google Shape;55;p13"/>
           <p:cNvSpPr/>
           <p:nvPr/>
         </p:nvSpPr>
         <p:spPr>
           <a:xfrm rot="21589200">
-            <a:off x="59040" y="519120"/>
-            <a:ext cx="3470760" cy="1044360"/>
+            <a:off x="57600" y="517680"/>
+            <a:ext cx="3469320" cy="1042920"/>
           </a:xfrm>
           <a:prstGeom prst="roundRect">
             <a:avLst>
@@ -2431,7 +2208,7 @@
               <a:buNone/>
             </a:pPr>
             <a:r>
-              <a:rPr b="1" lang="en-US" sz="700" spc="-1" strike="noStrike">
+              <a:rPr b="1" lang="en-US" sz="800" spc="-1" strike="noStrike">
                 <a:solidFill>
                   <a:srgbClr val="000000"/>
                 </a:solidFill>
@@ -2472,14 +2249,14 @@
       </p:sp>
       <p:sp>
         <p:nvSpPr>
-          <p:cNvPr id="44" name="Google Shape;56;p13"/>
+          <p:cNvPr id="42" name="Google Shape;56;p13"/>
           <p:cNvSpPr/>
           <p:nvPr/>
         </p:nvSpPr>
         <p:spPr>
           <a:xfrm>
             <a:off x="3657600" y="518760"/>
-            <a:ext cx="1919880" cy="1309320"/>
+            <a:ext cx="1918440" cy="1080720"/>
           </a:xfrm>
           <a:prstGeom prst="roundRect">
             <a:avLst>
@@ -2532,16 +2309,16 @@
               <a:buNone/>
             </a:pPr>
             <a:r>
-              <a:rPr b="0" lang="en" sz="600" spc="-1" strike="noStrike">
+              <a:rPr b="0" lang="en" sz="700" spc="-1" strike="noStrike">
                 <a:solidFill>
                   <a:srgbClr val="000000"/>
                 </a:solidFill>
                 <a:latin typeface="Arial"/>
                 <a:ea typeface="Arial"/>
               </a:rPr>
-              <a:t>Develop 1) file, 2) and field naming standards, 3) cartographic, and 4) directory order conventions to increase consistency between eSTZs</a:t>
+              <a:t>Develop: </a:t>
             </a:r>
-            <a:endParaRPr b="0" lang="en-US" sz="600" spc="-1" strike="noStrike">
+            <a:endParaRPr b="0" lang="en-US" sz="700" spc="-1" strike="noStrike">
               <a:latin typeface="Arial"/>
             </a:endParaRPr>
           </a:p>
@@ -2552,28 +2329,17 @@
               </a:lnSpc>
               <a:buNone/>
             </a:pPr>
-            <a:endParaRPr b="0" lang="en-US" sz="500" spc="-1" strike="noStrike">
-              <a:latin typeface="Arial"/>
-            </a:endParaRPr>
-          </a:p>
-          <a:p>
-            <a:pPr>
-              <a:lnSpc>
-                <a:spcPct val="100000"/>
-              </a:lnSpc>
-              <a:buNone/>
-            </a:pPr>
             <a:r>
-              <a:rPr b="0" lang="en" sz="600" spc="-1" strike="noStrike">
+              <a:rPr b="0" lang="en" sz="700" spc="-1" strike="noStrike">
                 <a:solidFill>
                   <a:srgbClr val="000000"/>
                 </a:solidFill>
                 <a:latin typeface="Arial"/>
                 <a:ea typeface="Arial"/>
               </a:rPr>
-              <a:t>5) Implement suggestions in an R package ‘eSTZwritR’ to aid adherence and allow for rapid uptake of conventions</a:t>
+              <a:t>1) file naming conventions</a:t>
             </a:r>
-            <a:endParaRPr b="0" lang="en-US" sz="600" spc="-1" strike="noStrike">
+            <a:endParaRPr b="0" lang="en-US" sz="700" spc="-1" strike="noStrike">
               <a:latin typeface="Arial"/>
             </a:endParaRPr>
           </a:p>
@@ -2584,43 +2350,95 @@
               </a:lnSpc>
               <a:buNone/>
             </a:pPr>
-            <a:endParaRPr b="0" lang="en-US" sz="500" spc="-1" strike="noStrike">
-              <a:latin typeface="Arial"/>
-            </a:endParaRPr>
-          </a:p>
-          <a:p>
-            <a:pPr>
-              <a:lnSpc>
-                <a:spcPct val="100000"/>
-              </a:lnSpc>
-              <a:buNone/>
-            </a:pPr>
             <a:r>
-              <a:rPr b="0" lang="en-US" sz="600" spc="-1" strike="noStrike">
+              <a:rPr b="0" lang="en" sz="700" spc="-1" strike="noStrike">
                 <a:solidFill>
                   <a:srgbClr val="000000"/>
                 </a:solidFill>
                 <a:latin typeface="Arial"/>
                 <a:ea typeface="Arial"/>
               </a:rPr>
-              <a:t>Incorporate estimates of uncertainty for spatial eSTZ data to support material selection from non-target seed zones</a:t>
+              <a:t>2) field naming standards in vector data</a:t>
             </a:r>
-            <a:endParaRPr b="0" lang="en-US" sz="600" spc="-1" strike="noStrike">
-              <a:latin typeface="Arial"/>
-            </a:endParaRPr>
-          </a:p>
-        </p:txBody>
-      </p:sp>
-      <p:sp>
-        <p:nvSpPr>
-          <p:cNvPr id="45" name="TextBox 6"/>
+            <a:endParaRPr b="0" lang="en-US" sz="700" spc="-1" strike="noStrike">
+              <a:latin typeface="Arial"/>
+            </a:endParaRPr>
+          </a:p>
+          <a:p>
+            <a:pPr>
+              <a:lnSpc>
+                <a:spcPct val="100000"/>
+              </a:lnSpc>
+              <a:buNone/>
+            </a:pPr>
+            <a:r>
+              <a:rPr b="0" lang="en" sz="700" spc="-1" strike="noStrike">
+                <a:solidFill>
+                  <a:srgbClr val="000000"/>
+                </a:solidFill>
+                <a:latin typeface="Arial"/>
+                <a:ea typeface="Arial"/>
+              </a:rPr>
+              <a:t>3) cartographic standards</a:t>
+            </a:r>
+            <a:endParaRPr b="0" lang="en-US" sz="700" spc="-1" strike="noStrike">
+              <a:latin typeface="Arial"/>
+            </a:endParaRPr>
+          </a:p>
+          <a:p>
+            <a:pPr>
+              <a:lnSpc>
+                <a:spcPct val="100000"/>
+              </a:lnSpc>
+              <a:buNone/>
+            </a:pPr>
+            <a:r>
+              <a:rPr b="0" lang="en" sz="700" spc="-1" strike="noStrike">
+                <a:solidFill>
+                  <a:srgbClr val="000000"/>
+                </a:solidFill>
+                <a:latin typeface="Arial"/>
+                <a:ea typeface="Arial"/>
+              </a:rPr>
+              <a:t>4) directory structure conventions</a:t>
+            </a:r>
+            <a:endParaRPr b="0" lang="en-US" sz="700" spc="-1" strike="noStrike">
+              <a:latin typeface="Arial"/>
+            </a:endParaRPr>
+          </a:p>
+          <a:p>
+            <a:pPr>
+              <a:lnSpc>
+                <a:spcPct val="100000"/>
+              </a:lnSpc>
+              <a:buNone/>
+            </a:pPr>
+            <a:r>
+              <a:rPr b="0" lang="en" sz="700" spc="-1" strike="noStrike">
+                <a:solidFill>
+                  <a:srgbClr val="000000"/>
+                </a:solidFill>
+                <a:latin typeface="Arial"/>
+                <a:ea typeface="Arial"/>
+              </a:rPr>
+              <a:t>5) Implement suggestions in an R package ‘eSTZwritR’ </a:t>
+            </a:r>
+            <a:endParaRPr b="0" lang="en-US" sz="700" spc="-1" strike="noStrike">
+              <a:latin typeface="Arial"/>
+            </a:endParaRPr>
+          </a:p>
+        </p:txBody>
+      </p:sp>
+      <p:sp>
+        <p:nvSpPr>
+          <p:cNvPr id="43" name="TextBox 6"/>
           <p:cNvSpPr/>
           <p:nvPr/>
         </p:nvSpPr>
         <p:spPr>
           <a:xfrm>
             <a:off x="5715000" y="503280"/>
-            <a:ext cx="3365280" cy="639720"/>
+            <a:ext cx="3363840" cy="824760"/>
           </a:xfrm>
           <a:prstGeom prst="roundRect">
             <a:avLst>
@@ -2662,7 +2480,7 @@
               <a:buNone/>
             </a:pPr>
             <a:r>
-              <a:rPr b="1" lang="en-US" sz="700" spc="-1" strike="noStrike">
+              <a:rPr b="1" lang="en-US" sz="800" spc="-1" strike="noStrike">
                 <a:solidFill>
                   <a:srgbClr val="000000"/>
                 </a:solidFill>
@@ -2682,7 +2500,7 @@
               <a:t>  </a:t>
             </a:r>
             <a:r>
-              <a:rPr b="0" lang="en-US" sz="600" spc="-1" strike="noStrike">
+              <a:rPr b="0" lang="en-US" sz="700" spc="-1" strike="noStrike">
                 <a:solidFill>
                   <a:srgbClr val="000000"/>
                 </a:solidFill>
@@ -2691,7 +2509,7 @@
               </a:rPr>
               <a:t>Reviewed all eSTZs on the Western Wildland Environmental Threat Assessment Center (WWETAC) website as of May 1, 2024. </a:t>
             </a:r>
-            <a:endParaRPr b="0" lang="en-US" sz="600" spc="-1" strike="noStrike">
+            <a:endParaRPr b="0" lang="en-US" sz="700" spc="-1" strike="noStrike">
               <a:latin typeface="Arial"/>
             </a:endParaRPr>
           </a:p>
@@ -2714,7 +2532,7 @@
               <a:buNone/>
             </a:pPr>
             <a:r>
-              <a:rPr b="0" lang="en-US" sz="600" spc="-1" strike="noStrike">
+              <a:rPr b="0" lang="en-US" sz="700" spc="-1" strike="noStrike">
                 <a:solidFill>
                   <a:srgbClr val="000000"/>
                 </a:solidFill>
@@ -2723,22 +2541,22 @@
               </a:rPr>
               <a:t>Each data product’s: file name structure, field naming conventions, and directory structure, were analyzed. All scoring was done by hand, and all analyses were carried out in R 4.2.1.</a:t>
             </a:r>
-            <a:endParaRPr b="0" lang="en-US" sz="600" spc="-1" strike="noStrike">
-              <a:latin typeface="Arial"/>
-            </a:endParaRPr>
-          </a:p>
-        </p:txBody>
-      </p:sp>
-      <p:sp>
-        <p:nvSpPr>
-          <p:cNvPr id="46" name="TextBox 31"/>
+            <a:endParaRPr b="0" lang="en-US" sz="700" spc="-1" strike="noStrike">
+              <a:latin typeface="Arial"/>
+            </a:endParaRPr>
+          </a:p>
+        </p:txBody>
+      </p:sp>
+      <p:sp>
+        <p:nvSpPr>
+          <p:cNvPr id="44" name="TextBox 31"/>
           <p:cNvSpPr/>
           <p:nvPr/>
         </p:nvSpPr>
         <p:spPr>
           <a:xfrm>
-            <a:off x="6368760" y="67680"/>
-            <a:ext cx="1834200" cy="364680"/>
+            <a:off x="6368760" y="64080"/>
+            <a:ext cx="1832760" cy="363240"/>
           </a:xfrm>
           <a:prstGeom prst="roundRect">
             <a:avLst>
@@ -2771,14 +2589,14 @@
       </p:sp>
       <p:sp>
         <p:nvSpPr>
-          <p:cNvPr id="47" name="Google Shape;56;p13"/>
+          <p:cNvPr id="45" name="Google Shape;56;p13"/>
           <p:cNvSpPr/>
           <p:nvPr/>
         </p:nvSpPr>
         <p:spPr>
           <a:xfrm>
-            <a:off x="3562200" y="4210920"/>
-            <a:ext cx="1923480" cy="817560"/>
+            <a:off x="3562200" y="4261320"/>
+            <a:ext cx="1922040" cy="816120"/>
           </a:xfrm>
           <a:prstGeom prst="roundRect">
             <a:avLst>
@@ -2823,7 +2641,7 @@
               </a:tabLst>
             </a:pPr>
             <a:r>
-              <a:rPr b="1" lang="en-US" sz="700" spc="-1" strike="noStrike">
+              <a:rPr b="1" lang="en-US" sz="800" spc="-1" strike="noStrike">
                 <a:solidFill>
                   <a:srgbClr val="000000"/>
                 </a:solidFill>
@@ -2930,7 +2748,7 @@
       </p:sp>
       <p:pic>
         <p:nvPicPr>
-          <p:cNvPr id="48" name="Picture 20" descr="">
+          <p:cNvPr id="46" name="Picture 20" descr="">
             <a:hlinkClick r:id="rId1"/>
           </p:cNvPr>
           <p:cNvPicPr/>
@@ -2942,8 +2760,8 @@
         </p:blipFill>
         <p:spPr>
           <a:xfrm>
-            <a:off x="7733880" y="3886200"/>
-            <a:ext cx="636480" cy="734760"/>
+            <a:off x="5943600" y="3340080"/>
+            <a:ext cx="494640" cy="571320"/>
           </a:xfrm>
           <a:prstGeom prst="rect">
             <a:avLst/>
@@ -2955,7 +2773,7 @@
       </p:pic>
       <p:pic>
         <p:nvPicPr>
-          <p:cNvPr id="49" name="Picture 22" descr=""/>
+          <p:cNvPr id="47" name="Picture 22" descr=""/>
           <p:cNvPicPr/>
           <p:nvPr/>
         </p:nvPicPr>
@@ -2966,7 +2784,7 @@
         <p:spPr>
           <a:xfrm>
             <a:off x="8282160" y="85320"/>
-            <a:ext cx="781560" cy="358920"/>
+            <a:ext cx="780120" cy="357480"/>
           </a:xfrm>
           <a:prstGeom prst="rect">
             <a:avLst/>
@@ -2978,7 +2796,7 @@
       </p:pic>
       <p:pic>
         <p:nvPicPr>
-          <p:cNvPr id="50" name="Picture 26" descr=""/>
+          <p:cNvPr id="48" name="Picture 26" descr=""/>
           <p:cNvPicPr/>
           <p:nvPr/>
         </p:nvPicPr>
@@ -2988,8 +2806,8 @@
         </p:blipFill>
         <p:spPr>
           <a:xfrm>
-            <a:off x="5698440" y="1371600"/>
-            <a:ext cx="1068840" cy="1068840"/>
+            <a:off x="5842440" y="2324520"/>
+            <a:ext cx="1014840" cy="1014840"/>
           </a:xfrm>
           <a:prstGeom prst="rect">
             <a:avLst/>
@@ -3001,7 +2819,7 @@
       </p:pic>
       <p:pic>
         <p:nvPicPr>
-          <p:cNvPr id="51" name="Picture 38" descr=""/>
+          <p:cNvPr id="49" name="Picture 6" descr=""/>
           <p:cNvPicPr/>
           <p:nvPr/>
         </p:nvPicPr>
@@ -3011,8 +2829,8 @@
         </p:blipFill>
         <p:spPr>
           <a:xfrm>
-            <a:off x="5715000" y="3429360"/>
-            <a:ext cx="1142280" cy="1480680"/>
+            <a:off x="7216920" y="1600200"/>
+            <a:ext cx="1697400" cy="736200"/>
           </a:xfrm>
           <a:prstGeom prst="rect">
             <a:avLst/>
@@ -3024,42 +2842,19 @@
       </p:pic>
       <p:pic>
         <p:nvPicPr>
-          <p:cNvPr id="52" name="Picture 6" descr=""/>
+          <p:cNvPr id="50" name="Picture 4" descr=""/>
           <p:cNvPicPr/>
           <p:nvPr/>
         </p:nvPicPr>
         <p:blipFill>
           <a:blip r:embed="rId6"/>
-          <a:stretch/>
-        </p:blipFill>
-        <p:spPr>
-          <a:xfrm>
-            <a:off x="7567560" y="1472400"/>
-            <a:ext cx="1397520" cy="606600"/>
-          </a:xfrm>
-          <a:prstGeom prst="rect">
-            <a:avLst/>
-          </a:prstGeom>
-          <a:ln w="0">
-            <a:noFill/>
-          </a:ln>
-        </p:spPr>
-      </p:pic>
-      <p:pic>
-        <p:nvPicPr>
-          <p:cNvPr id="53" name="Picture 4" descr=""/>
-          <p:cNvPicPr/>
-          <p:nvPr/>
-        </p:nvPicPr>
-        <p:blipFill>
-          <a:blip r:embed="rId7"/>
           <a:srcRect l="0" t="9165" r="0" b="13993"/>
           <a:stretch/>
         </p:blipFill>
         <p:spPr>
           <a:xfrm>
-            <a:off x="3390840" y="1828800"/>
-            <a:ext cx="2261520" cy="2317320"/>
+            <a:off x="3311280" y="1821600"/>
+            <a:ext cx="2453400" cy="2513880"/>
           </a:xfrm>
           <a:prstGeom prst="rect">
             <a:avLst/>
@@ -3071,295 +2866,14 @@
       </p:pic>
       <p:sp>
         <p:nvSpPr>
-          <p:cNvPr id="54" name="TextBox 39"/>
+          <p:cNvPr id="51" name="TextBox 56"/>
           <p:cNvSpPr/>
           <p:nvPr/>
         </p:nvSpPr>
         <p:spPr>
           <a:xfrm>
-            <a:off x="1671480" y="4111200"/>
-            <a:ext cx="1837440" cy="697320"/>
-          </a:xfrm>
-          <a:prstGeom prst="rect">
-            <a:avLst/>
-          </a:prstGeom>
-          <a:noFill/>
-          <a:ln w="0">
-            <a:noFill/>
-          </a:ln>
-        </p:spPr>
-        <p:style>
-          <a:lnRef idx="0"/>
-          <a:fillRef idx="0"/>
-          <a:effectRef idx="0"/>
-          <a:fontRef idx="minor"/>
-        </p:style>
-        <p:txBody>
-          <a:bodyPr lIns="90000" rIns="90000" tIns="45000" bIns="45000" anchor="t">
-            <a:spAutoFit/>
-          </a:bodyPr>
-          <a:p>
-            <a:pPr>
-              <a:lnSpc>
-                <a:spcPct val="100000"/>
-              </a:lnSpc>
-              <a:buNone/>
-            </a:pPr>
-            <a:r>
-              <a:rPr b="0" lang="en-US" sz="500" spc="-1" strike="noStrike" u="sng">
-                <a:solidFill>
-                  <a:srgbClr val="000000"/>
-                </a:solidFill>
-                <a:uFillTx/>
-                <a:latin typeface="Arial"/>
-                <a:ea typeface="Arial"/>
-              </a:rPr>
-              <a:t>Field Name Shapefile</a:t>
-            </a:r>
-            <a:endParaRPr b="0" lang="en-US" sz="500" spc="-1" strike="noStrike">
-              <a:latin typeface="Arial"/>
-            </a:endParaRPr>
-          </a:p>
-          <a:p>
-            <a:pPr>
-              <a:lnSpc>
-                <a:spcPct val="100000"/>
-              </a:lnSpc>
-              <a:buNone/>
-            </a:pPr>
-            <a:endParaRPr b="0" lang="en-US" sz="500" spc="-1" strike="noStrike">
-              <a:latin typeface="Arial"/>
-            </a:endParaRPr>
-          </a:p>
-          <a:p>
-            <a:pPr>
-              <a:lnSpc>
-                <a:spcPct val="100000"/>
-              </a:lnSpc>
-              <a:buNone/>
-            </a:pPr>
-            <a:r>
-              <a:rPr b="0" lang="en-US" sz="500" spc="-1" strike="noStrike">
-                <a:solidFill>
-                  <a:srgbClr val="000000"/>
-                </a:solidFill>
-                <a:latin typeface="Arial"/>
-                <a:ea typeface="Arial"/>
-              </a:rPr>
-              <a:t>- Some consensus with using USDA NRCS-Plants code for taxon denotation</a:t>
-            </a:r>
-            <a:endParaRPr b="0" lang="en-US" sz="500" spc="-1" strike="noStrike">
-              <a:latin typeface="Arial"/>
-            </a:endParaRPr>
-          </a:p>
-          <a:p>
-            <a:pPr>
-              <a:lnSpc>
-                <a:spcPct val="100000"/>
-              </a:lnSpc>
-              <a:buNone/>
-            </a:pPr>
-            <a:r>
-              <a:rPr b="0" lang="en-US" sz="500" spc="-1" strike="noStrike">
-                <a:solidFill>
-                  <a:srgbClr val="000000"/>
-                </a:solidFill>
-                <a:latin typeface="Arial"/>
-                <a:ea typeface="Arial"/>
-              </a:rPr>
-              <a:t>- Many files did not mention their attribute (seed zones)</a:t>
-            </a:r>
-            <a:endParaRPr b="0" lang="en-US" sz="500" spc="-1" strike="noStrike">
-              <a:latin typeface="Arial"/>
-            </a:endParaRPr>
-          </a:p>
-          <a:p>
-            <a:pPr>
-              <a:lnSpc>
-                <a:spcPct val="100000"/>
-              </a:lnSpc>
-              <a:buNone/>
-            </a:pPr>
-            <a:r>
-              <a:rPr b="0" lang="en-US" sz="500" spc="-1" strike="noStrike">
-                <a:solidFill>
-                  <a:srgbClr val="000000"/>
-                </a:solidFill>
-                <a:latin typeface="Arial"/>
-                <a:ea typeface="Arial"/>
-              </a:rPr>
-              <a:t>- Majority of files lack a specified geographic extent</a:t>
-            </a:r>
-            <a:endParaRPr b="0" lang="en-US" sz="500" spc="-1" strike="noStrike">
-              <a:latin typeface="Arial"/>
-            </a:endParaRPr>
-          </a:p>
-          <a:p>
-            <a:pPr>
-              <a:lnSpc>
-                <a:spcPct val="100000"/>
-              </a:lnSpc>
-              <a:buNone/>
-            </a:pPr>
-            <a:endParaRPr b="0" lang="en-US" sz="500" spc="-1" strike="noStrike">
-              <a:latin typeface="Arial"/>
-            </a:endParaRPr>
-          </a:p>
-          <a:p>
-            <a:pPr>
-              <a:lnSpc>
-                <a:spcPct val="100000"/>
-              </a:lnSpc>
-              <a:buNone/>
-            </a:pPr>
-            <a:endParaRPr b="0" lang="en-US" sz="500" spc="-1" strike="noStrike">
-              <a:latin typeface="Arial"/>
-            </a:endParaRPr>
-          </a:p>
-        </p:txBody>
-      </p:sp>
-      <p:sp>
-        <p:nvSpPr>
-          <p:cNvPr id="55" name="TextBox 44"/>
-          <p:cNvSpPr/>
-          <p:nvPr/>
-        </p:nvSpPr>
-        <p:spPr>
-          <a:xfrm>
-            <a:off x="1744920" y="3418200"/>
-            <a:ext cx="1683360" cy="925200"/>
-          </a:xfrm>
-          <a:prstGeom prst="rect">
-            <a:avLst/>
-          </a:prstGeom>
-          <a:noFill/>
-          <a:ln w="0">
-            <a:noFill/>
-          </a:ln>
-        </p:spPr>
-        <p:style>
-          <a:lnRef idx="0"/>
-          <a:fillRef idx="0"/>
-          <a:effectRef idx="0"/>
-          <a:fontRef idx="minor"/>
-        </p:style>
-        <p:txBody>
-          <a:bodyPr lIns="90000" rIns="90000" tIns="45000" bIns="45000" anchor="t">
-            <a:spAutoFit/>
-          </a:bodyPr>
-          <a:p>
-            <a:pPr>
-              <a:lnSpc>
-                <a:spcPct val="100000"/>
-              </a:lnSpc>
-              <a:buNone/>
-            </a:pPr>
-            <a:r>
-              <a:rPr b="0" lang="en-US" sz="500" spc="-1" strike="noStrike" u="sng">
-                <a:solidFill>
-                  <a:srgbClr val="000000"/>
-                </a:solidFill>
-                <a:uFillTx/>
-                <a:latin typeface="Arial"/>
-                <a:ea typeface="Arial"/>
-              </a:rPr>
-              <a:t>Map Components</a:t>
-            </a:r>
-            <a:endParaRPr b="0" lang="en-US" sz="500" spc="-1" strike="noStrike">
-              <a:latin typeface="Arial"/>
-            </a:endParaRPr>
-          </a:p>
-          <a:p>
-            <a:pPr>
-              <a:lnSpc>
-                <a:spcPct val="100000"/>
-              </a:lnSpc>
-              <a:buNone/>
-            </a:pPr>
-            <a:endParaRPr b="0" lang="en-US" sz="500" spc="-1" strike="noStrike">
-              <a:latin typeface="Arial"/>
-            </a:endParaRPr>
-          </a:p>
-          <a:p>
-            <a:pPr>
-              <a:lnSpc>
-                <a:spcPct val="100000"/>
-              </a:lnSpc>
-              <a:buNone/>
-            </a:pPr>
-            <a:r>
-              <a:rPr b="0" lang="en-US" sz="500" spc="-1" strike="noStrike">
-                <a:solidFill>
-                  <a:srgbClr val="000000"/>
-                </a:solidFill>
-                <a:latin typeface="Arial"/>
-                <a:ea typeface="Arial"/>
-              </a:rPr>
-              <a:t>Several essential cartographic (title, statement on data sources, legend for the seed zones) where missing from at least - or nearly half of the products inspected.</a:t>
-            </a:r>
-            <a:endParaRPr b="0" lang="en-US" sz="500" spc="-1" strike="noStrike">
-              <a:latin typeface="Arial"/>
-            </a:endParaRPr>
-          </a:p>
-          <a:p>
-            <a:pPr>
-              <a:lnSpc>
-                <a:spcPct val="100000"/>
-              </a:lnSpc>
-              <a:buNone/>
-            </a:pPr>
-            <a:br>
-              <a:rPr sz="500"/>
-            </a:br>
-            <a:endParaRPr b="0" lang="en-US" sz="500" spc="-1" strike="noStrike">
-              <a:latin typeface="Arial"/>
-            </a:endParaRPr>
-          </a:p>
-          <a:p>
-            <a:pPr>
-              <a:lnSpc>
-                <a:spcPct val="100000"/>
-              </a:lnSpc>
-              <a:buNone/>
-            </a:pPr>
-            <a:endParaRPr b="0" lang="en-US" sz="500" spc="-1" strike="noStrike">
-              <a:latin typeface="Arial"/>
-            </a:endParaRPr>
-          </a:p>
-          <a:p>
-            <a:pPr>
-              <a:lnSpc>
-                <a:spcPct val="100000"/>
-              </a:lnSpc>
-              <a:buNone/>
-            </a:pPr>
-            <a:endParaRPr b="0" lang="en-US" sz="500" spc="-1" strike="noStrike">
-              <a:latin typeface="Arial"/>
-            </a:endParaRPr>
-          </a:p>
-          <a:p>
-            <a:pPr>
-              <a:lnSpc>
-                <a:spcPct val="100000"/>
-              </a:lnSpc>
-              <a:buNone/>
-            </a:pPr>
-            <a:endParaRPr b="0" lang="en-US" sz="500" spc="-1" strike="noStrike">
-              <a:latin typeface="Arial"/>
-            </a:endParaRPr>
-          </a:p>
-        </p:txBody>
-      </p:sp>
-      <p:sp>
-        <p:nvSpPr>
-          <p:cNvPr id="56" name="TextBox 56"/>
-          <p:cNvSpPr/>
-          <p:nvPr/>
-        </p:nvSpPr>
-        <p:spPr>
-          <a:xfrm>
             <a:off x="1459440" y="1600200"/>
-            <a:ext cx="597960" cy="211320"/>
+            <a:ext cx="596520" cy="211320"/>
           </a:xfrm>
           <a:prstGeom prst="rect">
             <a:avLst/>
@@ -3404,14 +2918,14 @@
       </p:sp>
       <p:sp>
         <p:nvSpPr>
-          <p:cNvPr id="57" name="TextBox 57"/>
+          <p:cNvPr id="52" name="TextBox 57"/>
           <p:cNvSpPr/>
           <p:nvPr/>
         </p:nvSpPr>
         <p:spPr>
           <a:xfrm>
             <a:off x="4202640" y="518760"/>
-            <a:ext cx="1283040" cy="196200"/>
+            <a:ext cx="1281600" cy="211320"/>
           </a:xfrm>
           <a:prstGeom prst="rect">
             <a:avLst/>
@@ -3439,7 +2953,7 @@
               <a:buNone/>
             </a:pPr>
             <a:r>
-              <a:rPr b="1" lang="en-US" sz="700" spc="-1" strike="noStrike">
+              <a:rPr b="1" lang="en-US" sz="800" spc="-1" strike="noStrike">
                 <a:solidFill>
                   <a:srgbClr val="000000"/>
                 </a:solidFill>
@@ -3448,22 +2962,22 @@
               </a:rPr>
               <a:t>Objectives</a:t>
             </a:r>
-            <a:endParaRPr b="0" lang="en-US" sz="700" spc="-1" strike="noStrike">
-              <a:latin typeface="Arial"/>
-            </a:endParaRPr>
-          </a:p>
-        </p:txBody>
-      </p:sp>
-      <p:sp>
-        <p:nvSpPr>
-          <p:cNvPr id="58" name="TextBox 11"/>
+            <a:endParaRPr b="0" lang="en-US" sz="800" spc="-1" strike="noStrike">
+              <a:latin typeface="Arial"/>
+            </a:endParaRPr>
+          </a:p>
+        </p:txBody>
+      </p:sp>
+      <p:sp>
+        <p:nvSpPr>
+          <p:cNvPr id="53" name="TextBox 13"/>
           <p:cNvSpPr/>
           <p:nvPr/>
         </p:nvSpPr>
         <p:spPr>
           <a:xfrm>
-            <a:off x="6718680" y="1472400"/>
-            <a:ext cx="885600" cy="925200"/>
+            <a:off x="6965280" y="1371600"/>
+            <a:ext cx="1262160" cy="211320"/>
           </a:xfrm>
           <a:prstGeom prst="rect">
             <a:avLst/>
@@ -3491,368 +3005,7 @@
               <a:buNone/>
             </a:pPr>
             <a:r>
-              <a:rPr b="0" lang="en-US" sz="500" spc="-1" strike="noStrike" u="sng">
-                <a:solidFill>
-                  <a:srgbClr val="000000"/>
-                </a:solidFill>
-                <a:uFillTx/>
-                <a:latin typeface="Arial"/>
-                <a:ea typeface="Arial"/>
-              </a:rPr>
-              <a:t>Directory Structure</a:t>
-            </a:r>
-            <a:endParaRPr b="0" lang="en-US" sz="500" spc="-1" strike="noStrike">
-              <a:latin typeface="Arial"/>
-            </a:endParaRPr>
-          </a:p>
-          <a:p>
-            <a:pPr>
-              <a:lnSpc>
-                <a:spcPct val="100000"/>
-              </a:lnSpc>
-              <a:buNone/>
-            </a:pPr>
-            <a:endParaRPr b="0" lang="en-US" sz="500" spc="-1" strike="noStrike">
-              <a:latin typeface="Arial"/>
-            </a:endParaRPr>
-          </a:p>
-          <a:p>
-            <a:pPr>
-              <a:lnSpc>
-                <a:spcPct val="100000"/>
-              </a:lnSpc>
-              <a:buNone/>
-            </a:pPr>
-            <a:r>
-              <a:rPr b="0" lang="en-US" sz="500" spc="-1" strike="noStrike">
-                <a:solidFill>
-                  <a:srgbClr val="000000"/>
-                </a:solidFill>
-                <a:latin typeface="Arial"/>
-                <a:ea typeface="Arial"/>
-              </a:rPr>
-              <a:t>We recommend that all directories have two main subdirectories:</a:t>
-            </a:r>
-            <a:endParaRPr b="0" lang="en-US" sz="500" spc="-1" strike="noStrike">
-              <a:latin typeface="Arial"/>
-            </a:endParaRPr>
-          </a:p>
-          <a:p>
-            <a:pPr>
-              <a:lnSpc>
-                <a:spcPct val="100000"/>
-              </a:lnSpc>
-              <a:buNone/>
-            </a:pPr>
-            <a:r>
-              <a:rPr b="0" lang="en-US" sz="500" spc="-1" strike="noStrike">
-                <a:solidFill>
-                  <a:srgbClr val="000000"/>
-                </a:solidFill>
-                <a:latin typeface="Arial"/>
-                <a:ea typeface="Arial"/>
-              </a:rPr>
-              <a:t>- Essential data products (raster and vector data formats)</a:t>
-            </a:r>
-            <a:endParaRPr b="0" lang="en-US" sz="500" spc="-1" strike="noStrike">
-              <a:latin typeface="Arial"/>
-            </a:endParaRPr>
-          </a:p>
-          <a:p>
-            <a:pPr>
-              <a:lnSpc>
-                <a:spcPct val="100000"/>
-              </a:lnSpc>
-              <a:buNone/>
-            </a:pPr>
-            <a:r>
-              <a:rPr b="0" lang="en-US" sz="500" spc="-1" strike="noStrike">
-                <a:solidFill>
-                  <a:srgbClr val="000000"/>
-                </a:solidFill>
-                <a:latin typeface="Arial"/>
-                <a:ea typeface="Arial"/>
-              </a:rPr>
-              <a:t>- Product information (citation, map, metadata attributes)</a:t>
-            </a:r>
-            <a:endParaRPr b="0" lang="en-US" sz="500" spc="-1" strike="noStrike">
-              <a:latin typeface="Arial"/>
-            </a:endParaRPr>
-          </a:p>
-        </p:txBody>
-      </p:sp>
-      <p:sp>
-        <p:nvSpPr>
-          <p:cNvPr id="59" name="TextBox 62"/>
-          <p:cNvSpPr/>
-          <p:nvPr/>
-        </p:nvSpPr>
-        <p:spPr>
-          <a:xfrm>
-            <a:off x="6730920" y="2514600"/>
-            <a:ext cx="965160" cy="925200"/>
-          </a:xfrm>
-          <a:prstGeom prst="rect">
-            <a:avLst/>
-          </a:prstGeom>
-          <a:noFill/>
-          <a:ln w="0">
-            <a:noFill/>
-          </a:ln>
-        </p:spPr>
-        <p:style>
-          <a:lnRef idx="0"/>
-          <a:fillRef idx="0"/>
-          <a:effectRef idx="0"/>
-          <a:fontRef idx="minor"/>
-        </p:style>
-        <p:txBody>
-          <a:bodyPr lIns="90000" rIns="90000" tIns="45000" bIns="45000" anchor="t">
-            <a:spAutoFit/>
-          </a:bodyPr>
-          <a:p>
-            <a:pPr>
-              <a:lnSpc>
-                <a:spcPct val="100000"/>
-              </a:lnSpc>
-              <a:buNone/>
-            </a:pPr>
-            <a:r>
-              <a:rPr b="0" lang="en-US" sz="500" spc="-1" strike="noStrike" u="sng">
-                <a:solidFill>
-                  <a:srgbClr val="000000"/>
-                </a:solidFill>
-                <a:uFillTx/>
-                <a:latin typeface="Arial"/>
-                <a:ea typeface="Arial"/>
-              </a:rPr>
-              <a:t>File Naming Convention</a:t>
-            </a:r>
-            <a:endParaRPr b="0" lang="en-US" sz="500" spc="-1" strike="noStrike">
-              <a:latin typeface="Arial"/>
-            </a:endParaRPr>
-          </a:p>
-          <a:p>
-            <a:pPr>
-              <a:lnSpc>
-                <a:spcPct val="100000"/>
-              </a:lnSpc>
-              <a:buNone/>
-            </a:pPr>
-            <a:endParaRPr b="0" lang="en-US" sz="500" spc="-1" strike="noStrike">
-              <a:latin typeface="Arial"/>
-            </a:endParaRPr>
-          </a:p>
-          <a:p>
-            <a:pPr>
-              <a:lnSpc>
-                <a:spcPct val="100000"/>
-              </a:lnSpc>
-              <a:buNone/>
-            </a:pPr>
-            <a:r>
-              <a:rPr b="0" lang="en-US" sz="500" spc="-1" strike="noStrike">
-                <a:solidFill>
-                  <a:srgbClr val="000000"/>
-                </a:solidFill>
-                <a:latin typeface="Arial"/>
-                <a:ea typeface="Arial"/>
-              </a:rPr>
-              <a:t>We recommend that each file name has three main components:</a:t>
-            </a:r>
-            <a:endParaRPr b="0" lang="en-US" sz="500" spc="-1" strike="noStrike">
-              <a:latin typeface="Arial"/>
-            </a:endParaRPr>
-          </a:p>
-          <a:p>
-            <a:pPr>
-              <a:lnSpc>
-                <a:spcPct val="100000"/>
-              </a:lnSpc>
-              <a:buNone/>
-            </a:pPr>
-            <a:r>
-              <a:rPr b="0" lang="en-US" sz="500" spc="-1" strike="noStrike">
-                <a:solidFill>
-                  <a:srgbClr val="000000"/>
-                </a:solidFill>
-                <a:latin typeface="Arial"/>
-                <a:ea typeface="Arial"/>
-              </a:rPr>
-              <a:t>- The USDA PLANTS code (the specific taxon)</a:t>
-            </a:r>
-            <a:endParaRPr b="0" lang="en-US" sz="500" spc="-1" strike="noStrike">
-              <a:latin typeface="Arial"/>
-            </a:endParaRPr>
-          </a:p>
-          <a:p>
-            <a:pPr>
-              <a:lnSpc>
-                <a:spcPct val="100000"/>
-              </a:lnSpc>
-              <a:buNone/>
-            </a:pPr>
-            <a:r>
-              <a:rPr b="0" lang="en-US" sz="500" spc="-1" strike="noStrike">
-                <a:solidFill>
-                  <a:srgbClr val="000000"/>
-                </a:solidFill>
-                <a:latin typeface="Arial"/>
-                <a:ea typeface="Arial"/>
-              </a:rPr>
-              <a:t>-The type of data used to develop the STZ</a:t>
-            </a:r>
-            <a:endParaRPr b="0" lang="en-US" sz="500" spc="-1" strike="noStrike">
-              <a:latin typeface="Arial"/>
-            </a:endParaRPr>
-          </a:p>
-          <a:p>
-            <a:pPr>
-              <a:lnSpc>
-                <a:spcPct val="100000"/>
-              </a:lnSpc>
-              <a:buNone/>
-            </a:pPr>
-            <a:r>
-              <a:rPr b="0" lang="en-US" sz="500" spc="-1" strike="noStrike">
-                <a:solidFill>
-                  <a:srgbClr val="000000"/>
-                </a:solidFill>
-                <a:latin typeface="Arial"/>
-                <a:ea typeface="Arial"/>
-              </a:rPr>
-              <a:t>-The two main regions which the product overlaps</a:t>
-            </a:r>
-            <a:endParaRPr b="0" lang="en-US" sz="500" spc="-1" strike="noStrike">
-              <a:latin typeface="Arial"/>
-            </a:endParaRPr>
-          </a:p>
-        </p:txBody>
-      </p:sp>
-      <p:sp>
-        <p:nvSpPr>
-          <p:cNvPr id="60" name="TextBox 63"/>
-          <p:cNvSpPr/>
-          <p:nvPr/>
-        </p:nvSpPr>
-        <p:spPr>
-          <a:xfrm>
-            <a:off x="7494480" y="2057400"/>
-            <a:ext cx="1674720" cy="318240"/>
-          </a:xfrm>
-          <a:prstGeom prst="rect">
-            <a:avLst/>
-          </a:prstGeom>
-          <a:noFill/>
-          <a:ln w="0">
-            <a:noFill/>
-          </a:ln>
-        </p:spPr>
-        <p:style>
-          <a:lnRef idx="0"/>
-          <a:fillRef idx="0"/>
-          <a:effectRef idx="0"/>
-          <a:fontRef idx="minor"/>
-        </p:style>
-        <p:txBody>
-          <a:bodyPr lIns="90000" rIns="90000" tIns="45000" bIns="45000" anchor="t">
-            <a:spAutoFit/>
-          </a:bodyPr>
-          <a:p>
-            <a:pPr>
-              <a:lnSpc>
-                <a:spcPct val="100000"/>
-              </a:lnSpc>
-              <a:buNone/>
-            </a:pPr>
-            <a:r>
-              <a:rPr b="0" lang="en-US" sz="500" spc="-1" strike="noStrike" u="sng">
-                <a:solidFill>
-                  <a:srgbClr val="000000"/>
-                </a:solidFill>
-                <a:uFillTx/>
-                <a:latin typeface="Arial"/>
-                <a:ea typeface="Arial"/>
-              </a:rPr>
-              <a:t>Field Naming </a:t>
-            </a:r>
-            <a:r>
-              <a:rPr b="0" lang="en-US" sz="500" spc="-1" strike="noStrike">
-                <a:solidFill>
-                  <a:srgbClr val="000000"/>
-                </a:solidFill>
-                <a:latin typeface="Arial"/>
-                <a:ea typeface="Arial"/>
-              </a:rPr>
-              <a:t>Vector data should follow a predictable pattern, allowing humans interacting with the data to quickly detect their field of interest. </a:t>
-            </a:r>
-            <a:endParaRPr b="0" lang="en-US" sz="500" spc="-1" strike="noStrike">
-              <a:latin typeface="Arial"/>
-            </a:endParaRPr>
-          </a:p>
-        </p:txBody>
-      </p:sp>
-      <p:pic>
-        <p:nvPicPr>
-          <p:cNvPr id="61" name="Picture 22" descr="Using multiple predictions to create a consensus product."/>
-          <p:cNvPicPr/>
-          <p:nvPr/>
-        </p:nvPicPr>
-        <p:blipFill>
-          <a:blip r:embed="rId8"/>
-          <a:stretch/>
-        </p:blipFill>
-        <p:spPr>
-          <a:xfrm>
-            <a:off x="7562880" y="2602800"/>
-            <a:ext cx="799920" cy="1143360"/>
-          </a:xfrm>
-          <a:prstGeom prst="rect">
-            <a:avLst/>
-          </a:prstGeom>
-          <a:ln w="0">
-            <a:noFill/>
-          </a:ln>
-        </p:spPr>
-      </p:pic>
-      <p:sp>
-        <p:nvSpPr>
-          <p:cNvPr id="62" name="TextBox 13"/>
-          <p:cNvSpPr/>
-          <p:nvPr/>
-        </p:nvSpPr>
-        <p:spPr>
-          <a:xfrm>
-            <a:off x="6965280" y="1276560"/>
-            <a:ext cx="1263600" cy="196200"/>
-          </a:xfrm>
-          <a:prstGeom prst="rect">
-            <a:avLst/>
-          </a:prstGeom>
-          <a:noFill/>
-          <a:ln w="0">
-            <a:noFill/>
-          </a:ln>
-        </p:spPr>
-        <p:style>
-          <a:lnRef idx="0"/>
-          <a:fillRef idx="0"/>
-          <a:effectRef idx="0"/>
-          <a:fontRef idx="minor"/>
-        </p:style>
-        <p:txBody>
-          <a:bodyPr lIns="90000" rIns="90000" tIns="45000" bIns="45000" anchor="t">
-            <a:spAutoFit/>
-          </a:bodyPr>
-          <a:p>
-            <a:pPr>
-              <a:lnSpc>
-                <a:spcPct val="100000"/>
-              </a:lnSpc>
-              <a:buNone/>
-            </a:pPr>
-            <a:r>
-              <a:rPr b="1" lang="en-US" sz="700" spc="-1" strike="noStrike">
+              <a:rPr b="1" lang="en-US" sz="800" spc="-1" strike="noStrike">
                 <a:solidFill>
                   <a:srgbClr val="000000"/>
                 </a:solidFill>
@@ -3861,351 +3014,22 @@
               </a:rPr>
               <a:t>Suggestions</a:t>
             </a:r>
-            <a:endParaRPr b="0" lang="en-US" sz="700" spc="-1" strike="noStrike">
-              <a:latin typeface="Arial"/>
-            </a:endParaRPr>
-          </a:p>
-        </p:txBody>
-      </p:sp>
-      <p:sp>
-        <p:nvSpPr>
-          <p:cNvPr id="63" name="TextBox 64"/>
+            <a:endParaRPr b="0" lang="en-US" sz="800" spc="-1" strike="noStrike">
+              <a:latin typeface="Arial"/>
+            </a:endParaRPr>
+          </a:p>
+        </p:txBody>
+      </p:sp>
+      <p:sp>
+        <p:nvSpPr>
+          <p:cNvPr id="54" name="TextBox 20"/>
           <p:cNvSpPr/>
           <p:nvPr/>
         </p:nvSpPr>
         <p:spPr>
           <a:xfrm>
-            <a:off x="8243280" y="2602800"/>
-            <a:ext cx="936360" cy="1077120"/>
-          </a:xfrm>
-          <a:prstGeom prst="rect">
-            <a:avLst/>
-          </a:prstGeom>
-          <a:noFill/>
-          <a:ln w="0">
-            <a:noFill/>
-          </a:ln>
-        </p:spPr>
-        <p:style>
-          <a:lnRef idx="0"/>
-          <a:fillRef idx="0"/>
-          <a:effectRef idx="0"/>
-          <a:fontRef idx="minor"/>
-        </p:style>
-        <p:txBody>
-          <a:bodyPr lIns="90000" rIns="90000" tIns="45000" bIns="45000" anchor="t">
-            <a:spAutoFit/>
-          </a:bodyPr>
-          <a:p>
-            <a:pPr>
-              <a:lnSpc>
-                <a:spcPct val="100000"/>
-              </a:lnSpc>
-              <a:buNone/>
-            </a:pPr>
-            <a:r>
-              <a:rPr b="0" lang="en-US" sz="500" spc="-1" strike="noStrike" u="sng">
-                <a:solidFill>
-                  <a:srgbClr val="000000"/>
-                </a:solidFill>
-                <a:uFillTx/>
-                <a:latin typeface="Arial"/>
-                <a:ea typeface="Arial"/>
-              </a:rPr>
-              <a:t>Estimating Uncertainty</a:t>
-            </a:r>
-            <a:endParaRPr b="0" lang="en-US" sz="500" spc="-1" strike="noStrike">
-              <a:latin typeface="Arial"/>
-            </a:endParaRPr>
-          </a:p>
-          <a:p>
-            <a:pPr>
-              <a:lnSpc>
-                <a:spcPct val="100000"/>
-              </a:lnSpc>
-              <a:buNone/>
-            </a:pPr>
-            <a:endParaRPr b="0" lang="en-US" sz="500" spc="-1" strike="noStrike">
-              <a:latin typeface="Arial"/>
-            </a:endParaRPr>
-          </a:p>
-          <a:p>
-            <a:pPr>
-              <a:lnSpc>
-                <a:spcPct val="100000"/>
-              </a:lnSpc>
-              <a:buNone/>
-            </a:pPr>
-            <a:r>
-              <a:rPr b="0" lang="en-US" sz="500" spc="-1" strike="noStrike">
-                <a:solidFill>
-                  <a:srgbClr val="000000"/>
-                </a:solidFill>
-                <a:latin typeface="Arial"/>
-                <a:ea typeface="Arial"/>
-              </a:rPr>
-              <a:t>Using multiple predictions to create a consensus product:</a:t>
-            </a:r>
-            <a:endParaRPr b="0" lang="en-US" sz="500" spc="-1" strike="noStrike">
-              <a:latin typeface="Arial"/>
-            </a:endParaRPr>
-          </a:p>
-          <a:p>
-            <a:pPr>
-              <a:lnSpc>
-                <a:spcPct val="100000"/>
-              </a:lnSpc>
-              <a:buNone/>
-            </a:pPr>
-            <a:endParaRPr b="0" lang="en-US" sz="500" spc="-1" strike="noStrike">
-              <a:latin typeface="Arial"/>
-            </a:endParaRPr>
-          </a:p>
-          <a:p>
-            <a:pPr>
-              <a:lnSpc>
-                <a:spcPct val="100000"/>
-              </a:lnSpc>
-              <a:buNone/>
-            </a:pPr>
-            <a:r>
-              <a:rPr b="0" lang="en-US" sz="500" spc="-1" strike="noStrike">
-                <a:solidFill>
-                  <a:srgbClr val="000000"/>
-                </a:solidFill>
-                <a:latin typeface="Arial"/>
-                <a:ea typeface="Arial"/>
-              </a:rPr>
-              <a:t>- Vector data are generally preferable</a:t>
-            </a:r>
-            <a:endParaRPr b="0" lang="en-US" sz="500" spc="-1" strike="noStrike">
-              <a:latin typeface="Arial"/>
-            </a:endParaRPr>
-          </a:p>
-          <a:p>
-            <a:pPr>
-              <a:lnSpc>
-                <a:spcPct val="100000"/>
-              </a:lnSpc>
-              <a:buNone/>
-            </a:pPr>
-            <a:r>
-              <a:rPr b="0" lang="en-US" sz="500" spc="-1" strike="noStrike">
-                <a:solidFill>
-                  <a:srgbClr val="000000"/>
-                </a:solidFill>
-                <a:latin typeface="Arial"/>
-                <a:ea typeface="Arial"/>
-              </a:rPr>
-              <a:t>- We have observed classification confusion </a:t>
-            </a:r>
-            <a:endParaRPr b="0" lang="en-US" sz="500" spc="-1" strike="noStrike">
-              <a:latin typeface="Arial"/>
-            </a:endParaRPr>
-          </a:p>
-          <a:p>
-            <a:pPr>
-              <a:lnSpc>
-                <a:spcPct val="100000"/>
-              </a:lnSpc>
-              <a:buNone/>
-            </a:pPr>
-            <a:r>
-              <a:rPr b="0" lang="en-US" sz="500" spc="-1" strike="noStrike">
-                <a:solidFill>
-                  <a:srgbClr val="000000"/>
-                </a:solidFill>
-                <a:latin typeface="Arial"/>
-                <a:ea typeface="Arial"/>
-              </a:rPr>
-              <a:t>- We believe the inclusion of raster data is always warranted.</a:t>
-            </a:r>
-            <a:endParaRPr b="0" lang="en-US" sz="500" spc="-1" strike="noStrike">
-              <a:latin typeface="Arial"/>
-            </a:endParaRPr>
-          </a:p>
-        </p:txBody>
-      </p:sp>
-      <p:sp>
-        <p:nvSpPr>
-          <p:cNvPr id="64" name="TextBox 65"/>
-          <p:cNvSpPr/>
-          <p:nvPr/>
-        </p:nvSpPr>
-        <p:spPr>
-          <a:xfrm>
-            <a:off x="6738120" y="3429000"/>
-            <a:ext cx="995400" cy="469440"/>
-          </a:xfrm>
-          <a:prstGeom prst="rect">
-            <a:avLst/>
-          </a:prstGeom>
-          <a:noFill/>
-          <a:ln w="0">
-            <a:noFill/>
-          </a:ln>
-        </p:spPr>
-        <p:style>
-          <a:lnRef idx="0"/>
-          <a:fillRef idx="0"/>
-          <a:effectRef idx="0"/>
-          <a:fontRef idx="minor"/>
-        </p:style>
-        <p:txBody>
-          <a:bodyPr lIns="90000" rIns="90000" tIns="45000" bIns="45000" anchor="t">
-            <a:spAutoFit/>
-          </a:bodyPr>
-          <a:p>
-            <a:pPr>
-              <a:lnSpc>
-                <a:spcPct val="100000"/>
-              </a:lnSpc>
-              <a:buNone/>
-            </a:pPr>
-            <a:r>
-              <a:rPr b="0" lang="en-US" sz="500" spc="-1" strike="noStrike" u="sng">
-                <a:solidFill>
-                  <a:srgbClr val="000000"/>
-                </a:solidFill>
-                <a:uFillTx/>
-                <a:latin typeface="Arial"/>
-                <a:ea typeface="Arial"/>
-              </a:rPr>
-              <a:t>Map  Formatting</a:t>
-            </a:r>
-            <a:endParaRPr b="0" lang="en-US" sz="500" spc="-1" strike="noStrike">
-              <a:latin typeface="Arial"/>
-            </a:endParaRPr>
-          </a:p>
-          <a:p>
-            <a:pPr>
-              <a:lnSpc>
-                <a:spcPct val="100000"/>
-              </a:lnSpc>
-              <a:buNone/>
-            </a:pPr>
-            <a:endParaRPr b="0" lang="en-US" sz="500" spc="-1" strike="noStrike">
-              <a:latin typeface="Arial"/>
-            </a:endParaRPr>
-          </a:p>
-          <a:p>
-            <a:pPr>
-              <a:lnSpc>
-                <a:spcPct val="100000"/>
-              </a:lnSpc>
-              <a:buNone/>
-            </a:pPr>
-            <a:r>
-              <a:rPr b="0" lang="en-US" sz="500" spc="-1" strike="noStrike">
-                <a:solidFill>
-                  <a:srgbClr val="000000"/>
-                </a:solidFill>
-                <a:latin typeface="Arial"/>
-                <a:ea typeface="Arial"/>
-              </a:rPr>
-              <a:t>We recommend that each map contains the following elements:       </a:t>
-            </a:r>
-            <a:endParaRPr b="0" lang="en-US" sz="500" spc="-1" strike="noStrike">
-              <a:latin typeface="Arial"/>
-            </a:endParaRPr>
-          </a:p>
-        </p:txBody>
-      </p:sp>
-      <p:sp>
-        <p:nvSpPr>
-          <p:cNvPr id="65" name="TextBox 66"/>
-          <p:cNvSpPr/>
-          <p:nvPr/>
-        </p:nvSpPr>
-        <p:spPr>
-          <a:xfrm>
-            <a:off x="8438760" y="3982320"/>
-            <a:ext cx="636480" cy="1001160"/>
-          </a:xfrm>
-          <a:prstGeom prst="rect">
-            <a:avLst/>
-          </a:prstGeom>
-          <a:noFill/>
-          <a:ln w="0">
-            <a:noFill/>
-          </a:ln>
-        </p:spPr>
-        <p:style>
-          <a:lnRef idx="0"/>
-          <a:fillRef idx="0"/>
-          <a:effectRef idx="0"/>
-          <a:fontRef idx="minor"/>
-        </p:style>
-        <p:txBody>
-          <a:bodyPr lIns="90000" rIns="90000" tIns="45000" bIns="45000" anchor="t">
-            <a:spAutoFit/>
-          </a:bodyPr>
-          <a:p>
-            <a:pPr>
-              <a:lnSpc>
-                <a:spcPct val="100000"/>
-              </a:lnSpc>
-              <a:buNone/>
-            </a:pPr>
-            <a:r>
-              <a:rPr b="0" lang="en-US" sz="500" spc="-1" strike="noStrike" u="sng">
-                <a:solidFill>
-                  <a:srgbClr val="000000"/>
-                </a:solidFill>
-                <a:uFillTx/>
-                <a:latin typeface="Arial"/>
-                <a:ea typeface="Arial"/>
-              </a:rPr>
-              <a:t>R Package</a:t>
-            </a:r>
-            <a:endParaRPr b="0" lang="en-US" sz="500" spc="-1" strike="noStrike">
-              <a:latin typeface="Arial"/>
-            </a:endParaRPr>
-          </a:p>
-          <a:p>
-            <a:pPr>
-              <a:lnSpc>
-                <a:spcPct val="100000"/>
-              </a:lnSpc>
-              <a:buNone/>
-            </a:pPr>
-            <a:endParaRPr b="0" lang="en-US" sz="500" spc="-1" strike="noStrike">
-              <a:latin typeface="Arial"/>
-            </a:endParaRPr>
-          </a:p>
-          <a:p>
-            <a:pPr>
-              <a:lnSpc>
-                <a:spcPct val="100000"/>
-              </a:lnSpc>
-              <a:buNone/>
-            </a:pPr>
-            <a:r>
-              <a:rPr b="0" lang="en-US" sz="500" spc="-1" strike="noStrike">
-                <a:solidFill>
-                  <a:srgbClr val="000000"/>
-                </a:solidFill>
-                <a:latin typeface="Arial"/>
-                <a:ea typeface="Arial"/>
-              </a:rPr>
-              <a:t>eSTZwritR (‘pronounced easy rider’), can implement all suggestions and lessen the statistical processing, with minimal user inputs.</a:t>
-            </a:r>
-            <a:endParaRPr b="0" lang="en-US" sz="500" spc="-1" strike="noStrike">
-              <a:latin typeface="Arial"/>
-            </a:endParaRPr>
-          </a:p>
-        </p:txBody>
-      </p:sp>
-      <p:sp>
-        <p:nvSpPr>
-          <p:cNvPr id="66" name="TextBox 20"/>
-          <p:cNvSpPr/>
-          <p:nvPr/>
-        </p:nvSpPr>
-        <p:spPr>
-          <a:xfrm>
             <a:off x="6400800" y="67680"/>
-            <a:ext cx="1802160" cy="698040"/>
+            <a:ext cx="1800720" cy="698040"/>
           </a:xfrm>
           <a:prstGeom prst="rect">
             <a:avLst/>
@@ -4314,14 +3138,14 @@
       </p:sp>
       <p:sp>
         <p:nvSpPr>
-          <p:cNvPr id="67" name="TextBox 22"/>
+          <p:cNvPr id="55" name="TextBox 22"/>
           <p:cNvSpPr/>
           <p:nvPr/>
         </p:nvSpPr>
         <p:spPr>
           <a:xfrm>
-            <a:off x="6368760" y="220320"/>
-            <a:ext cx="1796040" cy="227160"/>
+            <a:off x="6289560" y="200520"/>
+            <a:ext cx="2625120" cy="226800"/>
           </a:xfrm>
           <a:prstGeom prst="rect">
             <a:avLst/>
@@ -4349,7 +3173,7 @@
               <a:buNone/>
             </a:pPr>
             <a:r>
-              <a:rPr b="1" lang="en-US" sz="540" spc="-1" strike="noStrike">
+              <a:rPr b="1" lang="en-US" sz="500" spc="-1" strike="noStrike">
                 <a:solidFill>
                   <a:srgbClr val="000000"/>
                 </a:solidFill>
@@ -4359,17 +3183,17 @@
               <a:t> </a:t>
             </a:r>
             <a:r>
-              <a:rPr b="1" lang="en-US" sz="440" spc="-1" strike="noStrike">
+              <a:rPr b="1" lang="en-US" sz="500" spc="-1" strike="noStrike">
                 <a:solidFill>
                   <a:srgbClr val="000000"/>
                 </a:solidFill>
                 <a:latin typeface="Arial"/>
                 <a:ea typeface="Arial"/>
               </a:rPr>
-              <a:t>E. Woodworth (art)</a:t>
+              <a:t>E. Woodworth (wu-naut)</a:t>
             </a:r>
             <a:r>
-              <a:rPr b="1" lang="en-US" sz="600" spc="-1" strike="noStrike">
+              <a:rPr b="1" lang="en-US" sz="700" spc="-1" strike="noStrike">
                 <a:solidFill>
                   <a:srgbClr val="000000"/>
                 </a:solidFill>
@@ -4414,346 +3238,55 @@
           </a:p>
         </p:txBody>
       </p:sp>
-      <p:sp>
-        <p:nvSpPr>
-          <p:cNvPr id="68" name="TextBox 26"/>
-          <p:cNvSpPr/>
-          <p:nvPr/>
-        </p:nvSpPr>
-        <p:spPr>
-          <a:xfrm>
-            <a:off x="6689160" y="3886200"/>
-            <a:ext cx="1253160" cy="1743480"/>
-          </a:xfrm>
-          <a:prstGeom prst="rect">
-            <a:avLst/>
-          </a:prstGeom>
-          <a:noFill/>
-          <a:ln w="0">
-            <a:noFill/>
-          </a:ln>
-        </p:spPr>
-        <p:style>
-          <a:lnRef idx="0"/>
-          <a:fillRef idx="0"/>
-          <a:effectRef idx="0"/>
-          <a:fontRef idx="minor"/>
-        </p:style>
-        <p:txBody>
-          <a:bodyPr numCol="2" spcCol="0" lIns="90000" rIns="90000" tIns="45000" bIns="45000" anchor="t">
-            <a:spAutoFit/>
-          </a:bodyPr>
-          <a:p>
-            <a:pPr>
-              <a:lnSpc>
-                <a:spcPct val="100000"/>
-              </a:lnSpc>
-              <a:buNone/>
-            </a:pPr>
-            <a:r>
-              <a:rPr b="0" lang="en-US" sz="500" spc="-1" strike="noStrike">
-                <a:solidFill>
-                  <a:srgbClr val="000000"/>
-                </a:solidFill>
-                <a:latin typeface="Arial"/>
-                <a:ea typeface="Arial"/>
-              </a:rPr>
-              <a:t>- North arrow</a:t>
-            </a:r>
-            <a:endParaRPr b="0" lang="en-US" sz="500" spc="-1" strike="noStrike">
-              <a:latin typeface="Arial"/>
-            </a:endParaRPr>
-          </a:p>
-          <a:p>
-            <a:pPr>
-              <a:lnSpc>
-                <a:spcPct val="100000"/>
-              </a:lnSpc>
-              <a:buNone/>
-            </a:pPr>
-            <a:r>
-              <a:rPr b="0" lang="en-US" sz="500" spc="-1" strike="noStrike">
-                <a:solidFill>
-                  <a:srgbClr val="000000"/>
-                </a:solidFill>
-                <a:latin typeface="Arial"/>
-                <a:ea typeface="Arial"/>
-              </a:rPr>
-              <a:t>- Scale bar</a:t>
-            </a:r>
-            <a:endParaRPr b="0" lang="en-US" sz="500" spc="-1" strike="noStrike">
-              <a:latin typeface="Arial"/>
-            </a:endParaRPr>
-          </a:p>
-          <a:p>
-            <a:pPr>
-              <a:lnSpc>
-                <a:spcPct val="100000"/>
-              </a:lnSpc>
-              <a:buNone/>
-            </a:pPr>
-            <a:r>
-              <a:rPr b="0" lang="en-US" sz="500" spc="-1" strike="noStrike">
-                <a:solidFill>
-                  <a:srgbClr val="000000"/>
-                </a:solidFill>
-                <a:latin typeface="Arial"/>
-                <a:ea typeface="Arial"/>
-              </a:rPr>
-              <a:t>- State border</a:t>
-            </a:r>
-            <a:endParaRPr b="0" lang="en-US" sz="500" spc="-1" strike="noStrike">
-              <a:latin typeface="Arial"/>
-            </a:endParaRPr>
-          </a:p>
-          <a:p>
-            <a:pPr>
-              <a:lnSpc>
-                <a:spcPct val="100000"/>
-              </a:lnSpc>
-              <a:buNone/>
-            </a:pPr>
-            <a:r>
-              <a:rPr b="0" lang="en-US" sz="500" spc="-1" strike="noStrike">
-                <a:solidFill>
-                  <a:srgbClr val="000000"/>
-                </a:solidFill>
-                <a:latin typeface="Arial"/>
-                <a:ea typeface="Arial"/>
-              </a:rPr>
-              <a:t>- Geographically relevant cities          </a:t>
-            </a:r>
-            <a:endParaRPr b="0" lang="en-US" sz="500" spc="-1" strike="noStrike">
-              <a:latin typeface="Arial"/>
-            </a:endParaRPr>
-          </a:p>
-          <a:p>
-            <a:pPr>
-              <a:lnSpc>
-                <a:spcPct val="100000"/>
-              </a:lnSpc>
-              <a:buNone/>
-            </a:pPr>
-            <a:r>
-              <a:rPr b="0" lang="en-US" sz="500" spc="-1" strike="noStrike">
-                <a:solidFill>
-                  <a:srgbClr val="000000"/>
-                </a:solidFill>
-                <a:latin typeface="Arial"/>
-                <a:ea typeface="Arial"/>
-              </a:rPr>
-              <a:t>- Coordinate reference system information</a:t>
-            </a:r>
-            <a:endParaRPr b="0" lang="en-US" sz="500" spc="-1" strike="noStrike">
-              <a:latin typeface="Arial"/>
-            </a:endParaRPr>
-          </a:p>
-          <a:p>
-            <a:pPr>
-              <a:lnSpc>
-                <a:spcPct val="100000"/>
-              </a:lnSpc>
-              <a:buNone/>
-            </a:pPr>
-            <a:r>
-              <a:rPr b="0" lang="en-US" sz="500" spc="-1" strike="noStrike">
-                <a:solidFill>
-                  <a:srgbClr val="000000"/>
-                </a:solidFill>
-                <a:latin typeface="Arial"/>
-                <a:ea typeface="Arial"/>
-              </a:rPr>
-              <a:t>- Color schemes for seed zones</a:t>
-            </a:r>
-            <a:endParaRPr b="0" lang="en-US" sz="500" spc="-1" strike="noStrike">
-              <a:latin typeface="Arial"/>
-            </a:endParaRPr>
-          </a:p>
-          <a:p>
-            <a:pPr>
-              <a:lnSpc>
-                <a:spcPct val="100000"/>
-              </a:lnSpc>
-              <a:buNone/>
-            </a:pPr>
-            <a:endParaRPr b="0" lang="en-US" sz="500" spc="-1" strike="noStrike">
-              <a:latin typeface="Arial"/>
-            </a:endParaRPr>
-          </a:p>
-          <a:p>
-            <a:pPr>
-              <a:lnSpc>
-                <a:spcPct val="100000"/>
-              </a:lnSpc>
-              <a:buNone/>
-            </a:pPr>
-            <a:r>
-              <a:rPr b="0" lang="en-US" sz="500" spc="-1" strike="noStrike">
-                <a:solidFill>
-                  <a:srgbClr val="000000"/>
-                </a:solidFill>
-                <a:latin typeface="Arial"/>
-                <a:ea typeface="Arial"/>
-              </a:rPr>
-              <a:t>- A legend</a:t>
-            </a:r>
-            <a:endParaRPr b="0" lang="en-US" sz="500" spc="-1" strike="noStrike">
-              <a:latin typeface="Arial"/>
-            </a:endParaRPr>
-          </a:p>
-          <a:p>
-            <a:pPr>
-              <a:lnSpc>
-                <a:spcPct val="100000"/>
-              </a:lnSpc>
-              <a:buNone/>
-            </a:pPr>
-            <a:r>
-              <a:rPr b="0" lang="en-US" sz="500" spc="-1" strike="noStrike">
-                <a:solidFill>
-                  <a:srgbClr val="000000"/>
-                </a:solidFill>
-                <a:latin typeface="Arial"/>
-                <a:ea typeface="Arial"/>
-              </a:rPr>
-              <a:t>- Title (the taxon name)</a:t>
-            </a:r>
-            <a:endParaRPr b="0" lang="en-US" sz="500" spc="-1" strike="noStrike">
-              <a:latin typeface="Arial"/>
-            </a:endParaRPr>
-          </a:p>
-          <a:p>
-            <a:pPr>
-              <a:lnSpc>
-                <a:spcPct val="100000"/>
-              </a:lnSpc>
-              <a:buNone/>
-            </a:pPr>
-            <a:r>
-              <a:rPr b="0" lang="en-US" sz="500" spc="-1" strike="noStrike">
-                <a:solidFill>
-                  <a:srgbClr val="000000"/>
-                </a:solidFill>
-                <a:latin typeface="Arial"/>
-                <a:ea typeface="Arial"/>
-              </a:rPr>
-              <a:t>- Map theme (‘Seed Transfer Zones’) as a subtitle.</a:t>
-            </a:r>
-            <a:endParaRPr b="0" lang="en-US" sz="500" spc="-1" strike="noStrike">
-              <a:latin typeface="Arial"/>
-            </a:endParaRPr>
-          </a:p>
-        </p:txBody>
-      </p:sp>
-      <p:sp>
-        <p:nvSpPr>
-          <p:cNvPr id="69" name="TextBox 74"/>
-          <p:cNvSpPr/>
-          <p:nvPr/>
-        </p:nvSpPr>
-        <p:spPr>
-          <a:xfrm>
-            <a:off x="109440" y="3042720"/>
-            <a:ext cx="1837440" cy="469440"/>
-          </a:xfrm>
-          <a:prstGeom prst="rect">
-            <a:avLst/>
-          </a:prstGeom>
-          <a:noFill/>
-          <a:ln w="0">
-            <a:noFill/>
-          </a:ln>
-        </p:spPr>
-        <p:style>
-          <a:lnRef idx="0"/>
-          <a:fillRef idx="0"/>
-          <a:effectRef idx="0"/>
-          <a:fontRef idx="minor"/>
-        </p:style>
-        <p:txBody>
-          <a:bodyPr lIns="90000" rIns="90000" tIns="45000" bIns="45000" anchor="t">
-            <a:spAutoFit/>
-          </a:bodyPr>
-          <a:p>
-            <a:pPr>
-              <a:lnSpc>
-                <a:spcPct val="100000"/>
-              </a:lnSpc>
-              <a:buNone/>
-            </a:pPr>
-            <a:r>
-              <a:rPr b="0" lang="en-US" sz="500" spc="-1" strike="noStrike" u="sng">
-                <a:solidFill>
-                  <a:srgbClr val="000000"/>
-                </a:solidFill>
-                <a:uFillTx/>
-                <a:latin typeface="Arial"/>
-                <a:ea typeface="Arial"/>
-              </a:rPr>
-              <a:t>Field Name Consistency</a:t>
-            </a:r>
-            <a:endParaRPr b="0" lang="en-US" sz="500" spc="-1" strike="noStrike">
-              <a:latin typeface="Arial"/>
-            </a:endParaRPr>
-          </a:p>
-          <a:p>
-            <a:pPr>
-              <a:lnSpc>
-                <a:spcPct val="100000"/>
-              </a:lnSpc>
-              <a:buNone/>
-            </a:pPr>
-            <a:endParaRPr b="0" lang="en-US" sz="500" spc="-1" strike="noStrike">
-              <a:latin typeface="Arial"/>
-            </a:endParaRPr>
-          </a:p>
-          <a:p>
-            <a:pPr>
-              <a:lnSpc>
-                <a:spcPct val="100000"/>
-              </a:lnSpc>
-              <a:buNone/>
-            </a:pPr>
-            <a:r>
-              <a:rPr b="0" lang="en-US" sz="500" spc="-1" strike="noStrike">
-                <a:solidFill>
-                  <a:srgbClr val="000000"/>
-                </a:solidFill>
-                <a:latin typeface="Arial"/>
-                <a:ea typeface="Arial"/>
-              </a:rPr>
-              <a:t>- Different usages of polygon geometry were used to represent the individual seed transfer zones </a:t>
-            </a:r>
-            <a:endParaRPr b="0" lang="en-US" sz="500" spc="-1" strike="noStrike">
-              <a:latin typeface="Arial"/>
-            </a:endParaRPr>
-          </a:p>
-          <a:p>
-            <a:pPr>
-              <a:lnSpc>
-                <a:spcPct val="100000"/>
-              </a:lnSpc>
-              <a:buNone/>
-            </a:pPr>
-            <a:r>
-              <a:rPr b="0" lang="en-US" sz="500" spc="-1" strike="noStrike">
-                <a:solidFill>
-                  <a:srgbClr val="000000"/>
-                </a:solidFill>
-                <a:latin typeface="Arial"/>
-                <a:ea typeface="Arial"/>
-              </a:rPr>
-              <a:t>- Field denoting seed zone was lacking or ambiguous</a:t>
-            </a:r>
-            <a:endParaRPr b="0" lang="en-US" sz="500" spc="-1" strike="noStrike">
-              <a:latin typeface="Arial"/>
-            </a:endParaRPr>
-          </a:p>
-        </p:txBody>
-      </p:sp>
       <p:pic>
         <p:nvPicPr>
-          <p:cNvPr id="70" name="" descr=""/>
+          <p:cNvPr id="56" name="" descr=""/>
+          <p:cNvPicPr/>
+          <p:nvPr/>
+        </p:nvPicPr>
+        <p:blipFill>
+          <a:blip r:embed="rId7"/>
+          <a:stretch/>
+        </p:blipFill>
+        <p:spPr>
+          <a:xfrm>
+            <a:off x="5715000" y="1371600"/>
+            <a:ext cx="1320480" cy="1027080"/>
+          </a:xfrm>
+          <a:prstGeom prst="rect">
+            <a:avLst/>
+          </a:prstGeom>
+          <a:ln w="0">
+            <a:noFill/>
+          </a:ln>
+        </p:spPr>
+      </p:pic>
+      <p:pic>
+        <p:nvPicPr>
+          <p:cNvPr id="57" name="" descr=""/>
+          <p:cNvPicPr/>
+          <p:nvPr/>
+        </p:nvPicPr>
+        <p:blipFill>
+          <a:blip r:embed="rId8"/>
+          <a:stretch/>
+        </p:blipFill>
+        <p:spPr>
+          <a:xfrm>
+            <a:off x="6438960" y="3340080"/>
+            <a:ext cx="1141920" cy="1631520"/>
+          </a:xfrm>
+          <a:prstGeom prst="rect">
+            <a:avLst/>
+          </a:prstGeom>
+          <a:ln w="0">
+            <a:noFill/>
+          </a:ln>
+        </p:spPr>
+      </p:pic>
+      <p:pic>
+        <p:nvPicPr>
+          <p:cNvPr id="58" name="" descr=""/>
           <p:cNvPicPr/>
           <p:nvPr/>
         </p:nvPicPr>
@@ -4763,8 +3296,8 @@
         </p:blipFill>
         <p:spPr>
           <a:xfrm>
-            <a:off x="5715000" y="2514600"/>
-            <a:ext cx="1015560" cy="790200"/>
+            <a:off x="7745400" y="3342960"/>
+            <a:ext cx="1176120" cy="1522440"/>
           </a:xfrm>
           <a:prstGeom prst="rect">
             <a:avLst/>
@@ -4776,7 +3309,7 @@
       </p:pic>
       <p:pic>
         <p:nvPicPr>
-          <p:cNvPr id="71" name="" descr=""/>
+          <p:cNvPr id="59" name="" descr=""/>
           <p:cNvPicPr/>
           <p:nvPr/>
         </p:nvPicPr>
@@ -4786,8 +3319,8 @@
         </p:blipFill>
         <p:spPr>
           <a:xfrm>
-            <a:off x="1791000" y="1829160"/>
-            <a:ext cx="1599840" cy="1599840"/>
+            <a:off x="7205760" y="2367720"/>
+            <a:ext cx="1665000" cy="913320"/>
           </a:xfrm>
           <a:prstGeom prst="rect">
             <a:avLst/>
@@ -4797,9 +3330,325 @@
           </a:ln>
         </p:spPr>
       </p:pic>
+      <p:sp>
+        <p:nvSpPr>
+          <p:cNvPr id="60" name=""/>
+          <p:cNvSpPr/>
+          <p:nvPr/>
+        </p:nvSpPr>
+        <p:spPr>
+          <a:xfrm>
+            <a:off x="5645880" y="3886200"/>
+            <a:ext cx="982800" cy="1142280"/>
+          </a:xfrm>
+          <a:prstGeom prst="rect">
+            <a:avLst/>
+          </a:prstGeom>
+          <a:noFill/>
+          <a:ln w="0">
+            <a:noFill/>
+          </a:ln>
+        </p:spPr>
+        <p:style>
+          <a:lnRef idx="0"/>
+          <a:fillRef idx="0"/>
+          <a:effectRef idx="0"/>
+          <a:fontRef idx="minor"/>
+        </p:style>
+        <p:txBody>
+          <a:bodyPr lIns="90000" rIns="90000" tIns="45000" bIns="45000" anchor="t">
+            <a:noAutofit/>
+          </a:bodyPr>
+          <a:p>
+            <a:pPr>
+              <a:lnSpc>
+                <a:spcPct val="100000"/>
+              </a:lnSpc>
+              <a:buNone/>
+            </a:pPr>
+            <a:r>
+              <a:rPr b="0" lang="en-US" sz="600" spc="-1" strike="noStrike">
+                <a:solidFill>
+                  <a:srgbClr val="000000"/>
+                </a:solidFill>
+                <a:latin typeface="Arial"/>
+                <a:ea typeface="DejaVu Sans"/>
+              </a:rPr>
+              <a:t>These suggestions can be implemented using an R package, ‘eSTZwritR’. Or by consulting it’s webpage. We look forward to collaboratively developing standards in the future!</a:t>
+            </a:r>
+            <a:endParaRPr b="0" lang="en-US" sz="600" spc="-1" strike="noStrike">
+              <a:latin typeface="Arial"/>
+            </a:endParaRPr>
+          </a:p>
+        </p:txBody>
+      </p:sp>
+      <p:sp>
+        <p:nvSpPr>
+          <p:cNvPr id="61" name=""/>
+          <p:cNvSpPr/>
+          <p:nvPr/>
+        </p:nvSpPr>
+        <p:spPr>
+          <a:xfrm>
+            <a:off x="1719360" y="3429000"/>
+            <a:ext cx="1708920" cy="1370880"/>
+          </a:xfrm>
+          <a:prstGeom prst="rect">
+            <a:avLst/>
+          </a:prstGeom>
+          <a:noFill/>
+          <a:ln w="0">
+            <a:noFill/>
+          </a:ln>
+        </p:spPr>
+        <p:style>
+          <a:lnRef idx="0"/>
+          <a:fillRef idx="0"/>
+          <a:effectRef idx="0"/>
+          <a:fontRef idx="minor"/>
+        </p:style>
+        <p:txBody>
+          <a:bodyPr lIns="90000" rIns="90000" tIns="45000" bIns="45000" anchor="t">
+            <a:noAutofit/>
+          </a:bodyPr>
+          <a:p>
+            <a:pPr>
+              <a:lnSpc>
+                <a:spcPct val="100000"/>
+              </a:lnSpc>
+              <a:buNone/>
+            </a:pPr>
+            <a:r>
+              <a:rPr b="0" lang="en-US" sz="700" spc="-1" strike="noStrike">
+                <a:solidFill>
+                  <a:srgbClr val="000000"/>
+                </a:solidFill>
+                <a:latin typeface="Arial"/>
+                <a:ea typeface="DejaVu Sans"/>
+              </a:rPr>
+              <a:t>Shapefile Properties</a:t>
+            </a:r>
+            <a:endParaRPr b="0" lang="en-US" sz="700" spc="-1" strike="noStrike">
+              <a:latin typeface="Arial"/>
+            </a:endParaRPr>
+          </a:p>
+          <a:p>
+            <a:pPr>
+              <a:lnSpc>
+                <a:spcPct val="100000"/>
+              </a:lnSpc>
+              <a:buNone/>
+            </a:pPr>
+            <a:endParaRPr b="0" lang="en-US" sz="500" spc="-1" strike="noStrike">
+              <a:latin typeface="Arial"/>
+            </a:endParaRPr>
+          </a:p>
+          <a:p>
+            <a:pPr>
+              <a:lnSpc>
+                <a:spcPct val="100000"/>
+              </a:lnSpc>
+              <a:buNone/>
+            </a:pPr>
+            <a:r>
+              <a:rPr b="0" lang="en-US" sz="500" spc="-1" strike="noStrike">
+                <a:solidFill>
+                  <a:srgbClr val="000000"/>
+                </a:solidFill>
+                <a:latin typeface="Arial"/>
+                <a:ea typeface="DejaVu Sans"/>
+              </a:rPr>
+              <a:t>- Different polygon types used for treating zones</a:t>
+            </a:r>
+            <a:endParaRPr b="0" lang="en-US" sz="500" spc="-1" strike="noStrike">
+              <a:latin typeface="Arial"/>
+            </a:endParaRPr>
+          </a:p>
+          <a:p>
+            <a:pPr>
+              <a:lnSpc>
+                <a:spcPct val="100000"/>
+              </a:lnSpc>
+              <a:buNone/>
+            </a:pPr>
+            <a:r>
+              <a:rPr b="0" lang="en-US" sz="500" spc="-1" strike="noStrike">
+                <a:solidFill>
+                  <a:srgbClr val="000000"/>
+                </a:solidFill>
+                <a:latin typeface="Arial"/>
+                <a:ea typeface="DejaVu Sans"/>
+              </a:rPr>
+              <a:t>- Field denoting seed zone was generally lacking</a:t>
+            </a:r>
+            <a:endParaRPr b="0" lang="en-US" sz="500" spc="-1" strike="noStrike">
+              <a:latin typeface="Arial"/>
+            </a:endParaRPr>
+          </a:p>
+          <a:p>
+            <a:pPr>
+              <a:lnSpc>
+                <a:spcPct val="100000"/>
+              </a:lnSpc>
+              <a:buNone/>
+            </a:pPr>
+            <a:endParaRPr b="0" lang="en-US" sz="500" spc="-1" strike="noStrike">
+              <a:latin typeface="Arial"/>
+            </a:endParaRPr>
+          </a:p>
+          <a:p>
+            <a:pPr>
+              <a:lnSpc>
+                <a:spcPct val="100000"/>
+              </a:lnSpc>
+              <a:buNone/>
+            </a:pPr>
+            <a:r>
+              <a:rPr b="0" lang="en-US" sz="700" spc="-1" strike="noStrike">
+                <a:solidFill>
+                  <a:srgbClr val="000000"/>
+                </a:solidFill>
+                <a:latin typeface="Arial"/>
+                <a:ea typeface="DejaVu Sans"/>
+              </a:rPr>
+              <a:t>File Names (shapefile)</a:t>
+            </a:r>
+            <a:endParaRPr b="0" lang="en-US" sz="700" spc="-1" strike="noStrike">
+              <a:latin typeface="Arial"/>
+            </a:endParaRPr>
+          </a:p>
+          <a:p>
+            <a:pPr>
+              <a:lnSpc>
+                <a:spcPct val="100000"/>
+              </a:lnSpc>
+              <a:buNone/>
+            </a:pPr>
+            <a:endParaRPr b="0" lang="en-US" sz="500" spc="-1" strike="noStrike">
+              <a:latin typeface="Arial"/>
+            </a:endParaRPr>
+          </a:p>
+          <a:p>
+            <a:pPr>
+              <a:lnSpc>
+                <a:spcPct val="100000"/>
+              </a:lnSpc>
+              <a:buNone/>
+            </a:pPr>
+            <a:r>
+              <a:rPr b="0" lang="en-US" sz="500" spc="-1" strike="noStrike">
+                <a:solidFill>
+                  <a:srgbClr val="000000"/>
+                </a:solidFill>
+                <a:latin typeface="Arial"/>
+                <a:ea typeface="DejaVu Sans"/>
+              </a:rPr>
+              <a:t>- Consensus to use USDA NRCS-Plants code</a:t>
+            </a:r>
+            <a:endParaRPr b="0" lang="en-US" sz="500" spc="-1" strike="noStrike">
+              <a:latin typeface="Arial"/>
+            </a:endParaRPr>
+          </a:p>
+          <a:p>
+            <a:pPr>
+              <a:lnSpc>
+                <a:spcPct val="100000"/>
+              </a:lnSpc>
+              <a:buNone/>
+            </a:pPr>
+            <a:r>
+              <a:rPr b="0" lang="en-US" sz="500" spc="-1" strike="noStrike">
+                <a:solidFill>
+                  <a:srgbClr val="000000"/>
+                </a:solidFill>
+                <a:latin typeface="Arial"/>
+                <a:ea typeface="DejaVu Sans"/>
+              </a:rPr>
+              <a:t>- Many files did not mention the data (seed zones)</a:t>
+            </a:r>
+            <a:endParaRPr b="0" lang="en-US" sz="500" spc="-1" strike="noStrike">
+              <a:latin typeface="Arial"/>
+            </a:endParaRPr>
+          </a:p>
+          <a:p>
+            <a:pPr>
+              <a:lnSpc>
+                <a:spcPct val="100000"/>
+              </a:lnSpc>
+              <a:buNone/>
+            </a:pPr>
+            <a:r>
+              <a:rPr b="0" lang="en-US" sz="500" spc="-1" strike="noStrike">
+                <a:solidFill>
+                  <a:srgbClr val="000000"/>
+                </a:solidFill>
+                <a:latin typeface="Arial"/>
+                <a:ea typeface="DejaVu Sans"/>
+              </a:rPr>
+              <a:t>- Majority of files lack a specified geographic extent</a:t>
+            </a:r>
+            <a:endParaRPr b="0" lang="en-US" sz="500" spc="-1" strike="noStrike">
+              <a:latin typeface="Arial"/>
+            </a:endParaRPr>
+          </a:p>
+          <a:p>
+            <a:pPr>
+              <a:lnSpc>
+                <a:spcPct val="100000"/>
+              </a:lnSpc>
+              <a:buNone/>
+            </a:pPr>
+            <a:endParaRPr b="0" lang="en-US" sz="500" spc="-1" strike="noStrike">
+              <a:latin typeface="Arial"/>
+            </a:endParaRPr>
+          </a:p>
+          <a:p>
+            <a:pPr>
+              <a:lnSpc>
+                <a:spcPct val="100000"/>
+              </a:lnSpc>
+              <a:buNone/>
+            </a:pPr>
+            <a:r>
+              <a:rPr b="0" lang="en-US" sz="700" spc="-1" strike="noStrike">
+                <a:solidFill>
+                  <a:srgbClr val="000000"/>
+                </a:solidFill>
+                <a:latin typeface="Arial"/>
+                <a:ea typeface="DejaVu Sans"/>
+              </a:rPr>
+              <a:t>Map Components</a:t>
+            </a:r>
+            <a:endParaRPr b="0" lang="en-US" sz="700" spc="-1" strike="noStrike">
+              <a:latin typeface="Arial"/>
+            </a:endParaRPr>
+          </a:p>
+          <a:p>
+            <a:pPr>
+              <a:lnSpc>
+                <a:spcPct val="100000"/>
+              </a:lnSpc>
+              <a:buNone/>
+            </a:pPr>
+            <a:r>
+              <a:rPr b="0" lang="en-US" sz="500" spc="-1" strike="noStrike">
+                <a:solidFill>
+                  <a:srgbClr val="000000"/>
+                </a:solidFill>
+                <a:latin typeface="Arial"/>
+                <a:ea typeface="DejaVu Sans"/>
+              </a:rPr>
+              <a:t>- Several essential cartographic elements (title, statement on data sources, legend for the seed zones) were missing from many products.</a:t>
+            </a:r>
+            <a:endParaRPr b="0" lang="en-US" sz="500" spc="-1" strike="noStrike">
+              <a:latin typeface="Arial"/>
+            </a:endParaRPr>
+          </a:p>
+        </p:txBody>
+      </p:sp>
       <p:pic>
         <p:nvPicPr>
-          <p:cNvPr id="72" name="" descr=""/>
+          <p:cNvPr id="62" name="" descr=""/>
           <p:cNvPicPr/>
           <p:nvPr/>
         </p:nvPicPr>
@@ -4809,8 +3658,8 @@
         </p:blipFill>
         <p:spPr>
           <a:xfrm>
-            <a:off x="228600" y="1828800"/>
-            <a:ext cx="1371240" cy="1371240"/>
+            <a:off x="1821600" y="1836000"/>
+            <a:ext cx="1482120" cy="1482120"/>
           </a:xfrm>
           <a:prstGeom prst="rect">
             <a:avLst/>
@@ -4822,7 +3671,7 @@
       </p:pic>
       <p:pic>
         <p:nvPicPr>
-          <p:cNvPr id="73" name="" descr=""/>
+          <p:cNvPr id="63" name="" descr=""/>
           <p:cNvPicPr/>
           <p:nvPr/>
         </p:nvPicPr>
@@ -4832,8 +3681,31 @@
         </p:blipFill>
         <p:spPr>
           <a:xfrm>
-            <a:off x="228600" y="3512160"/>
-            <a:ext cx="1371600" cy="1371600"/>
+            <a:off x="119160" y="1828800"/>
+            <a:ext cx="1599840" cy="1599840"/>
+          </a:xfrm>
+          <a:prstGeom prst="rect">
+            <a:avLst/>
+          </a:prstGeom>
+          <a:ln w="0">
+            <a:noFill/>
+          </a:ln>
+        </p:spPr>
+      </p:pic>
+      <p:pic>
+        <p:nvPicPr>
+          <p:cNvPr id="64" name="" descr=""/>
+          <p:cNvPicPr/>
+          <p:nvPr/>
+        </p:nvPicPr>
+        <p:blipFill>
+          <a:blip r:embed="rId13"/>
+          <a:stretch/>
+        </p:blipFill>
+        <p:spPr>
+          <a:xfrm>
+            <a:off x="109440" y="3467520"/>
+            <a:ext cx="1632240" cy="1104120"/>
           </a:xfrm>
           <a:prstGeom prst="rect">
             <a:avLst/>

</xml_diff>